<commit_message>
updated Paper/Presentation/Missin Stefanos Diploma Thesis Presentation.pptx
</commit_message>
<xml_diff>
--- a/Paper/Presentation/Missin Stefanos Diploma Thesis Presentation.pptx
+++ b/Paper/Presentation/Missin Stefanos Diploma Thesis Presentation.pptx
@@ -6,7 +6,7 @@
     <p:sldMasterId id="2147484042" r:id="rId2"/>
   </p:sldMasterIdLst>
   <p:notesMasterIdLst>
-    <p:notesMasterId r:id="rId16"/>
+    <p:notesMasterId r:id="rId17"/>
   </p:notesMasterIdLst>
   <p:sldIdLst>
     <p:sldId id="2700" r:id="rId3"/>
@@ -22,6 +22,7 @@
     <p:sldId id="2709" r:id="rId13"/>
     <p:sldId id="2710" r:id="rId14"/>
     <p:sldId id="2711" r:id="rId15"/>
+    <p:sldId id="2712" r:id="rId16"/>
   </p:sldIdLst>
   <p:sldSz cx="24377650" cy="13716000"/>
   <p:notesSz cx="6858000" cy="9144000"/>
@@ -218,7 +219,7 @@
             <a:fld id="{EFC10EE1-B198-C942-8235-326C972CBB30}" type="datetimeFigureOut">
               <a:rPr lang="en-US" smtClean="0"/>
               <a:pPr/>
-              <a:t>10/19/2018</a:t>
+              <a:t>10/21/2018</a:t>
             </a:fld>
             <a:endParaRPr lang="en-US" dirty="0"/>
           </a:p>
@@ -874,6 +875,232 @@
     <p:extLst>
       <p:ext uri="{BB962C8B-B14F-4D97-AF65-F5344CB8AC3E}">
         <p14:creationId xmlns:p14="http://schemas.microsoft.com/office/powerpoint/2010/main" val="269424568"/>
+      </p:ext>
+    </p:extLst>
+  </p:cSld>
+  <p:clrMapOvr>
+    <a:masterClrMapping/>
+  </p:clrMapOvr>
+</p:notes>
+</file>
+
+<file path=ppt/notesSlides/notesSlide11.xml><?xml version="1.0" encoding="utf-8"?>
+<p:notes xmlns:a="http://schemas.openxmlformats.org/drawingml/2006/main" xmlns:r="http://schemas.openxmlformats.org/officeDocument/2006/relationships" xmlns:p="http://schemas.openxmlformats.org/presentationml/2006/main">
+  <p:cSld>
+    <p:bg>
+      <p:bgPr>
+        <a:solidFill>
+          <a:srgbClr val="FFFFFF"/>
+        </a:solidFill>
+        <a:effectLst/>
+      </p:bgPr>
+    </p:bg>
+    <p:spTree>
+      <p:nvGrpSpPr>
+        <p:cNvPr id="1" name=""/>
+        <p:cNvGrpSpPr/>
+        <p:nvPr/>
+      </p:nvGrpSpPr>
+      <p:grpSpPr>
+        <a:xfrm>
+          <a:off x="0" y="0"/>
+          <a:ext cx="0" cy="0"/>
+          <a:chOff x="0" y="0"/>
+          <a:chExt cx="0" cy="0"/>
+        </a:xfrm>
+      </p:grpSpPr>
+      <p:sp>
+        <p:nvSpPr>
+          <p:cNvPr id="5" name="Rectangle 10"/>
+          <p:cNvSpPr>
+            <a:spLocks noGrp="1" noChangeArrowheads="1"/>
+          </p:cNvSpPr>
+          <p:nvPr>
+            <p:ph type="sldNum"/>
+          </p:nvPr>
+        </p:nvSpPr>
+        <p:spPr>
+          <a:ln/>
+        </p:spPr>
+        <p:txBody>
+          <a:bodyPr/>
+          <a:lstStyle/>
+          <a:p>
+            <a:pPr marL="0" marR="0" lvl="0" indent="0" algn="r" defTabSz="1828434" rtl="0" eaLnBrk="1" fontAlgn="auto" latinLnBrk="0" hangingPunct="1">
+              <a:lnSpc>
+                <a:spcPct val="100000"/>
+              </a:lnSpc>
+              <a:spcBef>
+                <a:spcPts val="0"/>
+              </a:spcBef>
+              <a:spcAft>
+                <a:spcPts val="0"/>
+              </a:spcAft>
+              <a:buClrTx/>
+              <a:buSzTx/>
+              <a:buFontTx/>
+              <a:buNone/>
+              <a:tabLst/>
+              <a:defRPr/>
+            </a:pPr>
+            <a:fld id="{77BD35B7-DAF1-5B4D-94FA-36B61FD74AC4}" type="slidenum">
+              <a:rPr kumimoji="0" lang="en-US" altLang="x-none" sz="1200" b="0" i="0" u="none" strike="noStrike" kern="1200" cap="none" spc="0" normalizeH="0" baseline="0" noProof="0">
+                <a:ln>
+                  <a:noFill/>
+                </a:ln>
+                <a:solidFill>
+                  <a:prstClr val="black"/>
+                </a:solidFill>
+                <a:effectLst/>
+                <a:uLnTx/>
+                <a:uFillTx/>
+                <a:latin typeface="Open Sans Light" charset="0"/>
+                <a:ea typeface="+mn-ea"/>
+                <a:cs typeface="+mn-cs"/>
+              </a:rPr>
+              <a:pPr marL="0" marR="0" lvl="0" indent="0" algn="r" defTabSz="1828434" rtl="0" eaLnBrk="1" fontAlgn="auto" latinLnBrk="0" hangingPunct="1">
+                <a:lnSpc>
+                  <a:spcPct val="100000"/>
+                </a:lnSpc>
+                <a:spcBef>
+                  <a:spcPts val="0"/>
+                </a:spcBef>
+                <a:spcAft>
+                  <a:spcPts val="0"/>
+                </a:spcAft>
+                <a:buClrTx/>
+                <a:buSzTx/>
+                <a:buFontTx/>
+                <a:buNone/>
+                <a:tabLst/>
+                <a:defRPr/>
+              </a:pPr>
+              <a:t>14</a:t>
+            </a:fld>
+            <a:endParaRPr kumimoji="0" lang="en-US" altLang="x-none" sz="1200" b="0" i="0" u="none" strike="noStrike" kern="1200" cap="none" spc="0" normalizeH="0" baseline="0" noProof="0">
+              <a:ln>
+                <a:noFill/>
+              </a:ln>
+              <a:solidFill>
+                <a:prstClr val="black"/>
+              </a:solidFill>
+              <a:effectLst/>
+              <a:uLnTx/>
+              <a:uFillTx/>
+              <a:latin typeface="Open Sans Light" charset="0"/>
+              <a:ea typeface="+mn-ea"/>
+              <a:cs typeface="+mn-cs"/>
+            </a:endParaRPr>
+          </a:p>
+        </p:txBody>
+      </p:sp>
+      <p:sp>
+        <p:nvSpPr>
+          <p:cNvPr id="18433" name="Text Box 1"/>
+          <p:cNvSpPr txBox="1">
+            <a:spLocks noGrp="1" noRot="1" noChangeAspect="1" noChangeArrowheads="1"/>
+          </p:cNvSpPr>
+          <p:nvPr>
+            <p:ph type="sldImg"/>
+          </p:nvPr>
+        </p:nvSpPr>
+        <p:spPr bwMode="auto">
+          <a:xfrm>
+            <a:off x="688975" y="1143000"/>
+            <a:ext cx="5475288" cy="3081338"/>
+          </a:xfrm>
+          <a:prstGeom prst="rect">
+            <a:avLst/>
+          </a:prstGeom>
+          <a:solidFill>
+            <a:srgbClr val="FFFFFF"/>
+          </a:solidFill>
+          <a:ln>
+            <a:solidFill>
+              <a:srgbClr val="000000"/>
+            </a:solidFill>
+            <a:miter lim="800000"/>
+            <a:headEnd/>
+            <a:tailEnd/>
+          </a:ln>
+          <a:extLst>
+            <a:ext uri="{AF507438-7753-43E0-B8FC-AC1667EBCBE1}">
+              <a14:hiddenEffects xmlns:a14="http://schemas.microsoft.com/office/drawing/2010/main">
+                <a:effectLst>
+                  <a:outerShdw blurRad="63500" dist="38099" dir="2700000" algn="ctr" rotWithShape="0">
+                    <a:srgbClr val="000000">
+                      <a:alpha val="74998"/>
+                    </a:srgbClr>
+                  </a:outerShdw>
+                </a:effectLst>
+              </a14:hiddenEffects>
+            </a:ext>
+          </a:extLst>
+        </p:spPr>
+      </p:sp>
+      <p:sp>
+        <p:nvSpPr>
+          <p:cNvPr id="18434" name="Text Box 2"/>
+          <p:cNvSpPr txBox="1">
+            <a:spLocks noGrp="1" noChangeArrowheads="1"/>
+          </p:cNvSpPr>
+          <p:nvPr>
+            <p:ph type="body" idx="1"/>
+          </p:nvPr>
+        </p:nvSpPr>
+        <p:spPr bwMode="auto">
+          <a:xfrm>
+            <a:off x="685800" y="4400550"/>
+            <a:ext cx="5481638" cy="3595688"/>
+          </a:xfrm>
+          <a:prstGeom prst="rect">
+            <a:avLst/>
+          </a:prstGeom>
+          <a:noFill/>
+          <a:ln/>
+          <a:extLst>
+            <a:ext uri="{909E8E84-426E-40DD-AFC4-6F175D3DCCD1}">
+              <a14:hiddenFill xmlns:a14="http://schemas.microsoft.com/office/drawing/2010/main">
+                <a:solidFill>
+                  <a:srgbClr val="FFFFFF"/>
+                </a:solidFill>
+              </a14:hiddenFill>
+            </a:ext>
+            <a:ext uri="{91240B29-F687-4F45-9708-019B960494DF}">
+              <a14:hiddenLine xmlns:a14="http://schemas.microsoft.com/office/drawing/2010/main" w="9525" cap="flat">
+                <a:solidFill>
+                  <a:srgbClr val="808080"/>
+                </a:solidFill>
+                <a:round/>
+                <a:headEnd/>
+                <a:tailEnd/>
+              </a14:hiddenLine>
+            </a:ext>
+            <a:ext uri="{AF507438-7753-43E0-B8FC-AC1667EBCBE1}">
+              <a14:hiddenEffects xmlns:a14="http://schemas.microsoft.com/office/drawing/2010/main">
+                <a:effectLst>
+                  <a:outerShdw blurRad="63500" dist="38099" dir="2700000" algn="ctr" rotWithShape="0">
+                    <a:srgbClr val="000000">
+                      <a:alpha val="74998"/>
+                    </a:srgbClr>
+                  </a:outerShdw>
+                </a:effectLst>
+              </a14:hiddenEffects>
+            </a:ext>
+          </a:extLst>
+        </p:spPr>
+        <p:txBody>
+          <a:bodyPr wrap="none" anchor="ctr"/>
+          <a:lstStyle/>
+          <a:p>
+            <a:endParaRPr lang="x-none" altLang="x-none" dirty="0"/>
+          </a:p>
+        </p:txBody>
+      </p:sp>
+    </p:spTree>
+    <p:extLst>
+      <p:ext uri="{BB962C8B-B14F-4D97-AF65-F5344CB8AC3E}">
+        <p14:creationId xmlns:p14="http://schemas.microsoft.com/office/powerpoint/2010/main" val="3168199008"/>
       </p:ext>
     </p:extLst>
   </p:cSld>
@@ -6222,7 +6449,7 @@
         </p:nvSpPr>
         <p:spPr>
           <a:xfrm>
-            <a:off x="6035944" y="2758588"/>
+            <a:off x="6035944" y="2437713"/>
             <a:ext cx="11774758" cy="707886"/>
           </a:xfrm>
           <a:prstGeom prst="rect">
@@ -10407,6 +10634,528 @@
           </a:p>
         </p:txBody>
       </p:sp>
+      <p:pic>
+        <p:nvPicPr>
+          <p:cNvPr id="3" name="Εικόνα 2">
+            <a:extLst>
+              <a:ext uri="{FF2B5EF4-FFF2-40B4-BE49-F238E27FC236}">
+                <a16:creationId xmlns:a16="http://schemas.microsoft.com/office/drawing/2014/main" id="{AF8B9066-C4B8-49A3-A044-88DFC88D3293}"/>
+              </a:ext>
+            </a:extLst>
+          </p:cNvPr>
+          <p:cNvPicPr>
+            <a:picLocks noChangeAspect="1"/>
+          </p:cNvPicPr>
+          <p:nvPr/>
+        </p:nvPicPr>
+        <p:blipFill>
+          <a:blip r:embed="rId7" cstate="email">
+            <a:extLst>
+              <a:ext uri="{28A0092B-C50C-407E-A947-70E740481C1C}">
+                <a14:useLocalDpi xmlns:a14="http://schemas.microsoft.com/office/drawing/2010/main" val="0"/>
+              </a:ext>
+            </a:extLst>
+          </a:blip>
+          <a:stretch>
+            <a:fillRect/>
+          </a:stretch>
+        </p:blipFill>
+        <p:spPr>
+          <a:xfrm>
+            <a:off x="2489273" y="3626271"/>
+            <a:ext cx="4690014" cy="3407309"/>
+          </a:xfrm>
+          <a:prstGeom prst="rect">
+            <a:avLst/>
+          </a:prstGeom>
+        </p:spPr>
+      </p:pic>
+      <p:sp>
+        <p:nvSpPr>
+          <p:cNvPr id="21" name="TextBox 20">
+            <a:extLst>
+              <a:ext uri="{FF2B5EF4-FFF2-40B4-BE49-F238E27FC236}">
+                <a16:creationId xmlns:a16="http://schemas.microsoft.com/office/drawing/2014/main" id="{863DE23E-3CF4-4C0E-95DD-730226F119E4}"/>
+              </a:ext>
+            </a:extLst>
+          </p:cNvPr>
+          <p:cNvSpPr txBox="1"/>
+          <p:nvPr/>
+        </p:nvSpPr>
+        <p:spPr>
+          <a:xfrm>
+            <a:off x="2871036" y="2681717"/>
+            <a:ext cx="4269352" cy="646331"/>
+          </a:xfrm>
+          <a:prstGeom prst="rect">
+            <a:avLst/>
+          </a:prstGeom>
+          <a:noFill/>
+        </p:spPr>
+        <p:txBody>
+          <a:bodyPr wrap="square" rtlCol="0">
+            <a:spAutoFit/>
+          </a:bodyPr>
+          <a:lstStyle/>
+          <a:p>
+            <a:pPr marL="571500" indent="-571500">
+              <a:buBlip>
+                <a:blip r:embed="rId8"/>
+              </a:buBlip>
+            </a:pPr>
+            <a:r>
+              <a:rPr lang="en-US" dirty="0">
+                <a:solidFill>
+                  <a:srgbClr val="445469"/>
+                </a:solidFill>
+                <a:latin typeface="Montserrat Bold"/>
+              </a:rPr>
+              <a:t>Arduino Uno Rev3</a:t>
+            </a:r>
+            <a:endParaRPr lang="el-GR" dirty="0">
+              <a:solidFill>
+                <a:srgbClr val="445469"/>
+              </a:solidFill>
+              <a:latin typeface="Montserrat Bold"/>
+            </a:endParaRPr>
+          </a:p>
+        </p:txBody>
+      </p:sp>
+      <p:pic>
+        <p:nvPicPr>
+          <p:cNvPr id="7" name="Εικόνα 6">
+            <a:extLst>
+              <a:ext uri="{FF2B5EF4-FFF2-40B4-BE49-F238E27FC236}">
+                <a16:creationId xmlns:a16="http://schemas.microsoft.com/office/drawing/2014/main" id="{563244FA-58EA-4363-B5EF-121893D3D61C}"/>
+              </a:ext>
+            </a:extLst>
+          </p:cNvPr>
+          <p:cNvPicPr>
+            <a:picLocks noChangeAspect="1"/>
+          </p:cNvPicPr>
+          <p:nvPr/>
+        </p:nvPicPr>
+        <p:blipFill>
+          <a:blip r:embed="rId9" cstate="email">
+            <a:extLst>
+              <a:ext uri="{28A0092B-C50C-407E-A947-70E740481C1C}">
+                <a14:useLocalDpi xmlns:a14="http://schemas.microsoft.com/office/drawing/2010/main" val="0"/>
+              </a:ext>
+            </a:extLst>
+          </a:blip>
+          <a:stretch>
+            <a:fillRect/>
+          </a:stretch>
+        </p:blipFill>
+        <p:spPr>
+          <a:xfrm>
+            <a:off x="9834093" y="3336702"/>
+            <a:ext cx="3796938" cy="3521298"/>
+          </a:xfrm>
+          <a:prstGeom prst="rect">
+            <a:avLst/>
+          </a:prstGeom>
+        </p:spPr>
+      </p:pic>
+      <p:sp>
+        <p:nvSpPr>
+          <p:cNvPr id="22" name="TextBox 21">
+            <a:extLst>
+              <a:ext uri="{FF2B5EF4-FFF2-40B4-BE49-F238E27FC236}">
+                <a16:creationId xmlns:a16="http://schemas.microsoft.com/office/drawing/2014/main" id="{F9130A2F-0C58-43E8-913C-970A0ECF4D4A}"/>
+              </a:ext>
+            </a:extLst>
+          </p:cNvPr>
+          <p:cNvSpPr txBox="1"/>
+          <p:nvPr/>
+        </p:nvSpPr>
+        <p:spPr>
+          <a:xfrm>
+            <a:off x="10115431" y="2620892"/>
+            <a:ext cx="4269352" cy="646331"/>
+          </a:xfrm>
+          <a:prstGeom prst="rect">
+            <a:avLst/>
+          </a:prstGeom>
+          <a:noFill/>
+        </p:spPr>
+        <p:txBody>
+          <a:bodyPr wrap="square" rtlCol="0">
+            <a:spAutoFit/>
+          </a:bodyPr>
+          <a:lstStyle/>
+          <a:p>
+            <a:pPr marL="571500" indent="-571500">
+              <a:buBlip>
+                <a:blip r:embed="rId8"/>
+              </a:buBlip>
+            </a:pPr>
+            <a:r>
+              <a:rPr lang="en-US" dirty="0">
+                <a:solidFill>
+                  <a:srgbClr val="445469"/>
+                </a:solidFill>
+                <a:latin typeface="Montserrat Bold"/>
+              </a:rPr>
+              <a:t>WeMos D1 R2</a:t>
+            </a:r>
+            <a:endParaRPr lang="el-GR" dirty="0">
+              <a:solidFill>
+                <a:srgbClr val="445469"/>
+              </a:solidFill>
+              <a:latin typeface="Montserrat Bold"/>
+            </a:endParaRPr>
+          </a:p>
+        </p:txBody>
+      </p:sp>
+      <p:sp>
+        <p:nvSpPr>
+          <p:cNvPr id="23" name="TextBox 22">
+            <a:extLst>
+              <a:ext uri="{FF2B5EF4-FFF2-40B4-BE49-F238E27FC236}">
+                <a16:creationId xmlns:a16="http://schemas.microsoft.com/office/drawing/2014/main" id="{28BE560A-6EE4-4839-89EC-1B012B178833}"/>
+              </a:ext>
+            </a:extLst>
+          </p:cNvPr>
+          <p:cNvSpPr txBox="1"/>
+          <p:nvPr/>
+        </p:nvSpPr>
+        <p:spPr>
+          <a:xfrm>
+            <a:off x="18587916" y="2620891"/>
+            <a:ext cx="4269352" cy="646331"/>
+          </a:xfrm>
+          <a:prstGeom prst="rect">
+            <a:avLst/>
+          </a:prstGeom>
+          <a:noFill/>
+        </p:spPr>
+        <p:txBody>
+          <a:bodyPr wrap="square" rtlCol="0">
+            <a:spAutoFit/>
+          </a:bodyPr>
+          <a:lstStyle/>
+          <a:p>
+            <a:pPr marL="571500" indent="-571500">
+              <a:buBlip>
+                <a:blip r:embed="rId8"/>
+              </a:buBlip>
+            </a:pPr>
+            <a:r>
+              <a:rPr lang="en-US" dirty="0">
+                <a:solidFill>
+                  <a:srgbClr val="445469"/>
+                </a:solidFill>
+                <a:latin typeface="Montserrat Bold"/>
+              </a:rPr>
+              <a:t>DHT 22</a:t>
+            </a:r>
+            <a:endParaRPr lang="el-GR" dirty="0">
+              <a:solidFill>
+                <a:srgbClr val="445469"/>
+              </a:solidFill>
+              <a:latin typeface="Montserrat Bold"/>
+            </a:endParaRPr>
+          </a:p>
+        </p:txBody>
+      </p:sp>
+      <p:pic>
+        <p:nvPicPr>
+          <p:cNvPr id="24" name="Εικόνα 23">
+            <a:extLst>
+              <a:ext uri="{FF2B5EF4-FFF2-40B4-BE49-F238E27FC236}">
+                <a16:creationId xmlns:a16="http://schemas.microsoft.com/office/drawing/2014/main" id="{E9775377-995C-425D-ABD6-3D3972263FCA}"/>
+              </a:ext>
+            </a:extLst>
+          </p:cNvPr>
+          <p:cNvPicPr>
+            <a:picLocks noChangeAspect="1"/>
+          </p:cNvPicPr>
+          <p:nvPr/>
+        </p:nvPicPr>
+        <p:blipFill>
+          <a:blip r:embed="rId10" cstate="email">
+            <a:extLst>
+              <a:ext uri="{28A0092B-C50C-407E-A947-70E740481C1C}">
+                <a14:useLocalDpi xmlns:a14="http://schemas.microsoft.com/office/drawing/2010/main" val="0"/>
+              </a:ext>
+            </a:extLst>
+          </a:blip>
+          <a:stretch>
+            <a:fillRect/>
+          </a:stretch>
+        </p:blipFill>
+        <p:spPr>
+          <a:xfrm>
+            <a:off x="17619728" y="3267222"/>
+            <a:ext cx="3586284" cy="3586284"/>
+          </a:xfrm>
+          <a:prstGeom prst="rect">
+            <a:avLst/>
+          </a:prstGeom>
+        </p:spPr>
+      </p:pic>
+      <p:pic>
+        <p:nvPicPr>
+          <p:cNvPr id="10" name="Εικόνα 9">
+            <a:extLst>
+              <a:ext uri="{FF2B5EF4-FFF2-40B4-BE49-F238E27FC236}">
+                <a16:creationId xmlns:a16="http://schemas.microsoft.com/office/drawing/2014/main" id="{E0F34FBB-CC65-4596-9456-722199759FC9}"/>
+              </a:ext>
+            </a:extLst>
+          </p:cNvPr>
+          <p:cNvPicPr>
+            <a:picLocks noChangeAspect="1"/>
+          </p:cNvPicPr>
+          <p:nvPr/>
+        </p:nvPicPr>
+        <p:blipFill>
+          <a:blip r:embed="rId11">
+            <a:extLst>
+              <a:ext uri="{28A0092B-C50C-407E-A947-70E740481C1C}">
+                <a14:useLocalDpi xmlns:a14="http://schemas.microsoft.com/office/drawing/2010/main" val="0"/>
+              </a:ext>
+            </a:extLst>
+          </a:blip>
+          <a:stretch>
+            <a:fillRect/>
+          </a:stretch>
+        </p:blipFill>
+        <p:spPr>
+          <a:xfrm>
+            <a:off x="3010410" y="8300835"/>
+            <a:ext cx="4062803" cy="2918352"/>
+          </a:xfrm>
+          <a:prstGeom prst="rect">
+            <a:avLst/>
+          </a:prstGeom>
+        </p:spPr>
+      </p:pic>
+      <p:sp>
+        <p:nvSpPr>
+          <p:cNvPr id="28" name="TextBox 27">
+            <a:extLst>
+              <a:ext uri="{FF2B5EF4-FFF2-40B4-BE49-F238E27FC236}">
+                <a16:creationId xmlns:a16="http://schemas.microsoft.com/office/drawing/2014/main" id="{B8D1DAC0-882F-4498-9AD8-8BF2DD323D50}"/>
+              </a:ext>
+            </a:extLst>
+          </p:cNvPr>
+          <p:cNvSpPr txBox="1"/>
+          <p:nvPr/>
+        </p:nvSpPr>
+        <p:spPr>
+          <a:xfrm>
+            <a:off x="2353324" y="7344042"/>
+            <a:ext cx="5304776" cy="646331"/>
+          </a:xfrm>
+          <a:prstGeom prst="rect">
+            <a:avLst/>
+          </a:prstGeom>
+          <a:noFill/>
+        </p:spPr>
+        <p:txBody>
+          <a:bodyPr wrap="square" rtlCol="0">
+            <a:spAutoFit/>
+          </a:bodyPr>
+          <a:lstStyle/>
+          <a:p>
+            <a:pPr marL="571500" indent="-571500">
+              <a:buBlip>
+                <a:blip r:embed="rId8"/>
+              </a:buBlip>
+            </a:pPr>
+            <a:r>
+              <a:rPr lang="en-US" dirty="0">
+                <a:solidFill>
+                  <a:srgbClr val="445469"/>
+                </a:solidFill>
+                <a:latin typeface="Montserrat Bold"/>
+              </a:rPr>
+              <a:t>Arduino Ethernet Shield</a:t>
+            </a:r>
+            <a:endParaRPr lang="el-GR" dirty="0">
+              <a:solidFill>
+                <a:srgbClr val="445469"/>
+              </a:solidFill>
+              <a:latin typeface="Montserrat Bold"/>
+            </a:endParaRPr>
+          </a:p>
+        </p:txBody>
+      </p:sp>
+      <p:pic>
+        <p:nvPicPr>
+          <p:cNvPr id="29" name="Εικόνα 28">
+            <a:extLst>
+              <a:ext uri="{FF2B5EF4-FFF2-40B4-BE49-F238E27FC236}">
+                <a16:creationId xmlns:a16="http://schemas.microsoft.com/office/drawing/2014/main" id="{D962D135-6B5A-41E4-AB27-142ECC74185A}"/>
+              </a:ext>
+            </a:extLst>
+          </p:cNvPr>
+          <p:cNvPicPr>
+            <a:picLocks noChangeAspect="1"/>
+          </p:cNvPicPr>
+          <p:nvPr/>
+        </p:nvPicPr>
+        <p:blipFill>
+          <a:blip r:embed="rId12" cstate="email">
+            <a:extLst>
+              <a:ext uri="{28A0092B-C50C-407E-A947-70E740481C1C}">
+                <a14:useLocalDpi xmlns:a14="http://schemas.microsoft.com/office/drawing/2010/main" val="0"/>
+              </a:ext>
+            </a:extLst>
+          </a:blip>
+          <a:stretch>
+            <a:fillRect/>
+          </a:stretch>
+        </p:blipFill>
+        <p:spPr>
+          <a:xfrm>
+            <a:off x="10395589" y="7819028"/>
+            <a:ext cx="4062803" cy="4062803"/>
+          </a:xfrm>
+          <a:prstGeom prst="rect">
+            <a:avLst/>
+          </a:prstGeom>
+        </p:spPr>
+      </p:pic>
+      <p:sp>
+        <p:nvSpPr>
+          <p:cNvPr id="30" name="TextBox 29">
+            <a:extLst>
+              <a:ext uri="{FF2B5EF4-FFF2-40B4-BE49-F238E27FC236}">
+                <a16:creationId xmlns:a16="http://schemas.microsoft.com/office/drawing/2014/main" id="{31635797-BE92-454E-AE0B-1DB86E080093}"/>
+              </a:ext>
+            </a:extLst>
+          </p:cNvPr>
+          <p:cNvSpPr txBox="1"/>
+          <p:nvPr/>
+        </p:nvSpPr>
+        <p:spPr>
+          <a:xfrm>
+            <a:off x="9572521" y="7399861"/>
+            <a:ext cx="5304776" cy="646331"/>
+          </a:xfrm>
+          <a:prstGeom prst="rect">
+            <a:avLst/>
+          </a:prstGeom>
+          <a:noFill/>
+        </p:spPr>
+        <p:txBody>
+          <a:bodyPr wrap="square" rtlCol="0">
+            <a:spAutoFit/>
+          </a:bodyPr>
+          <a:lstStyle/>
+          <a:p>
+            <a:pPr marL="571500" indent="-571500">
+              <a:buBlip>
+                <a:blip r:embed="rId8"/>
+              </a:buBlip>
+            </a:pPr>
+            <a:r>
+              <a:rPr lang="en-US" dirty="0">
+                <a:solidFill>
+                  <a:srgbClr val="445469"/>
+                </a:solidFill>
+                <a:latin typeface="Montserrat Bold"/>
+              </a:rPr>
+              <a:t>Breadboard 400 pins</a:t>
+            </a:r>
+            <a:endParaRPr lang="el-GR" dirty="0">
+              <a:solidFill>
+                <a:srgbClr val="445469"/>
+              </a:solidFill>
+              <a:latin typeface="Montserrat Bold"/>
+            </a:endParaRPr>
+          </a:p>
+        </p:txBody>
+      </p:sp>
+      <p:pic>
+        <p:nvPicPr>
+          <p:cNvPr id="35" name="Εικόνα 34">
+            <a:extLst>
+              <a:ext uri="{FF2B5EF4-FFF2-40B4-BE49-F238E27FC236}">
+                <a16:creationId xmlns:a16="http://schemas.microsoft.com/office/drawing/2014/main" id="{DF2A0A30-199C-4356-8AF2-8463681CCCD3}"/>
+              </a:ext>
+            </a:extLst>
+          </p:cNvPr>
+          <p:cNvPicPr>
+            <a:picLocks noChangeAspect="1"/>
+          </p:cNvPicPr>
+          <p:nvPr/>
+        </p:nvPicPr>
+        <p:blipFill>
+          <a:blip r:embed="rId13">
+            <a:extLst>
+              <a:ext uri="{28A0092B-C50C-407E-A947-70E740481C1C}">
+                <a14:useLocalDpi xmlns:a14="http://schemas.microsoft.com/office/drawing/2010/main" val="0"/>
+              </a:ext>
+            </a:extLst>
+          </a:blip>
+          <a:stretch>
+            <a:fillRect/>
+          </a:stretch>
+        </p:blipFill>
+        <p:spPr>
+          <a:xfrm>
+            <a:off x="17343789" y="8001333"/>
+            <a:ext cx="3535108" cy="3217854"/>
+          </a:xfrm>
+          <a:prstGeom prst="rect">
+            <a:avLst/>
+          </a:prstGeom>
+        </p:spPr>
+      </p:pic>
+      <p:sp>
+        <p:nvSpPr>
+          <p:cNvPr id="36" name="TextBox 35">
+            <a:extLst>
+              <a:ext uri="{FF2B5EF4-FFF2-40B4-BE49-F238E27FC236}">
+                <a16:creationId xmlns:a16="http://schemas.microsoft.com/office/drawing/2014/main" id="{102285E1-6B7F-4AE9-B273-BE3949C85F9F}"/>
+              </a:ext>
+            </a:extLst>
+          </p:cNvPr>
+          <p:cNvSpPr txBox="1"/>
+          <p:nvPr/>
+        </p:nvSpPr>
+        <p:spPr>
+          <a:xfrm>
+            <a:off x="16520720" y="7399861"/>
+            <a:ext cx="5304776" cy="646331"/>
+          </a:xfrm>
+          <a:prstGeom prst="rect">
+            <a:avLst/>
+          </a:prstGeom>
+          <a:noFill/>
+        </p:spPr>
+        <p:txBody>
+          <a:bodyPr wrap="square" rtlCol="0">
+            <a:spAutoFit/>
+          </a:bodyPr>
+          <a:lstStyle/>
+          <a:p>
+            <a:pPr marL="571500" indent="-571500">
+              <a:buBlip>
+                <a:blip r:embed="rId8"/>
+              </a:buBlip>
+            </a:pPr>
+            <a:r>
+              <a:rPr lang="en-US" dirty="0">
+                <a:solidFill>
+                  <a:srgbClr val="445469"/>
+                </a:solidFill>
+                <a:latin typeface="Montserrat Bold"/>
+              </a:rPr>
+              <a:t>Router TG585 v7</a:t>
+            </a:r>
+            <a:endParaRPr lang="el-GR" dirty="0">
+              <a:solidFill>
+                <a:srgbClr val="445469"/>
+              </a:solidFill>
+              <a:latin typeface="Montserrat Bold"/>
+            </a:endParaRPr>
+          </a:p>
+        </p:txBody>
+      </p:sp>
     </p:spTree>
     <p:extLst>
       <p:ext uri="{BB962C8B-B14F-4D97-AF65-F5344CB8AC3E}">
@@ -10420,6 +11169,2237 @@
   <p:transition spd="slow">
     <p:push dir="u"/>
   </p:transition>
+  <p:timing>
+    <p:tnLst>
+      <p:par>
+        <p:cTn id="1" dur="indefinite" restart="never" nodeType="tmRoot">
+          <p:childTnLst>
+            <p:seq concurrent="1" nextAc="seek">
+              <p:cTn id="2" dur="indefinite" nodeType="mainSeq">
+                <p:childTnLst>
+                  <p:par>
+                    <p:cTn id="3" fill="hold">
+                      <p:stCondLst>
+                        <p:cond delay="indefinite"/>
+                      </p:stCondLst>
+                      <p:childTnLst>
+                        <p:par>
+                          <p:cTn id="4" fill="hold">
+                            <p:stCondLst>
+                              <p:cond delay="0"/>
+                            </p:stCondLst>
+                            <p:childTnLst>
+                              <p:par>
+                                <p:cTn id="5" presetID="10" presetClass="entr" presetSubtype="0" fill="hold" grpId="0" nodeType="clickEffect">
+                                  <p:stCondLst>
+                                    <p:cond delay="0"/>
+                                  </p:stCondLst>
+                                  <p:childTnLst>
+                                    <p:set>
+                                      <p:cBhvr>
+                                        <p:cTn id="6" dur="1" fill="hold">
+                                          <p:stCondLst>
+                                            <p:cond delay="0"/>
+                                          </p:stCondLst>
+                                        </p:cTn>
+                                        <p:tgtEl>
+                                          <p:spTgt spid="21"/>
+                                        </p:tgtEl>
+                                        <p:attrNameLst>
+                                          <p:attrName>style.visibility</p:attrName>
+                                        </p:attrNameLst>
+                                      </p:cBhvr>
+                                      <p:to>
+                                        <p:strVal val="visible"/>
+                                      </p:to>
+                                    </p:set>
+                                    <p:animEffect transition="in" filter="fade">
+                                      <p:cBhvr>
+                                        <p:cTn id="7" dur="500"/>
+                                        <p:tgtEl>
+                                          <p:spTgt spid="21"/>
+                                        </p:tgtEl>
+                                      </p:cBhvr>
+                                    </p:animEffect>
+                                  </p:childTnLst>
+                                </p:cTn>
+                              </p:par>
+                              <p:par>
+                                <p:cTn id="8" presetID="10" presetClass="entr" presetSubtype="0" fill="hold" nodeType="withEffect">
+                                  <p:stCondLst>
+                                    <p:cond delay="0"/>
+                                  </p:stCondLst>
+                                  <p:childTnLst>
+                                    <p:set>
+                                      <p:cBhvr>
+                                        <p:cTn id="9" dur="1" fill="hold">
+                                          <p:stCondLst>
+                                            <p:cond delay="0"/>
+                                          </p:stCondLst>
+                                        </p:cTn>
+                                        <p:tgtEl>
+                                          <p:spTgt spid="3"/>
+                                        </p:tgtEl>
+                                        <p:attrNameLst>
+                                          <p:attrName>style.visibility</p:attrName>
+                                        </p:attrNameLst>
+                                      </p:cBhvr>
+                                      <p:to>
+                                        <p:strVal val="visible"/>
+                                      </p:to>
+                                    </p:set>
+                                    <p:animEffect transition="in" filter="fade">
+                                      <p:cBhvr>
+                                        <p:cTn id="10" dur="500"/>
+                                        <p:tgtEl>
+                                          <p:spTgt spid="3"/>
+                                        </p:tgtEl>
+                                      </p:cBhvr>
+                                    </p:animEffect>
+                                  </p:childTnLst>
+                                </p:cTn>
+                              </p:par>
+                            </p:childTnLst>
+                          </p:cTn>
+                        </p:par>
+                      </p:childTnLst>
+                    </p:cTn>
+                  </p:par>
+                  <p:par>
+                    <p:cTn id="11" fill="hold">
+                      <p:stCondLst>
+                        <p:cond delay="indefinite"/>
+                      </p:stCondLst>
+                      <p:childTnLst>
+                        <p:par>
+                          <p:cTn id="12" fill="hold">
+                            <p:stCondLst>
+                              <p:cond delay="0"/>
+                            </p:stCondLst>
+                            <p:childTnLst>
+                              <p:par>
+                                <p:cTn id="13" presetID="10" presetClass="entr" presetSubtype="0" fill="hold" grpId="0" nodeType="clickEffect">
+                                  <p:stCondLst>
+                                    <p:cond delay="0"/>
+                                  </p:stCondLst>
+                                  <p:childTnLst>
+                                    <p:set>
+                                      <p:cBhvr>
+                                        <p:cTn id="14" dur="1" fill="hold">
+                                          <p:stCondLst>
+                                            <p:cond delay="0"/>
+                                          </p:stCondLst>
+                                        </p:cTn>
+                                        <p:tgtEl>
+                                          <p:spTgt spid="22"/>
+                                        </p:tgtEl>
+                                        <p:attrNameLst>
+                                          <p:attrName>style.visibility</p:attrName>
+                                        </p:attrNameLst>
+                                      </p:cBhvr>
+                                      <p:to>
+                                        <p:strVal val="visible"/>
+                                      </p:to>
+                                    </p:set>
+                                    <p:animEffect transition="in" filter="fade">
+                                      <p:cBhvr>
+                                        <p:cTn id="15" dur="500"/>
+                                        <p:tgtEl>
+                                          <p:spTgt spid="22"/>
+                                        </p:tgtEl>
+                                      </p:cBhvr>
+                                    </p:animEffect>
+                                  </p:childTnLst>
+                                </p:cTn>
+                              </p:par>
+                              <p:par>
+                                <p:cTn id="16" presetID="10" presetClass="entr" presetSubtype="0" fill="hold" nodeType="withEffect">
+                                  <p:stCondLst>
+                                    <p:cond delay="0"/>
+                                  </p:stCondLst>
+                                  <p:childTnLst>
+                                    <p:set>
+                                      <p:cBhvr>
+                                        <p:cTn id="17" dur="1" fill="hold">
+                                          <p:stCondLst>
+                                            <p:cond delay="0"/>
+                                          </p:stCondLst>
+                                        </p:cTn>
+                                        <p:tgtEl>
+                                          <p:spTgt spid="7"/>
+                                        </p:tgtEl>
+                                        <p:attrNameLst>
+                                          <p:attrName>style.visibility</p:attrName>
+                                        </p:attrNameLst>
+                                      </p:cBhvr>
+                                      <p:to>
+                                        <p:strVal val="visible"/>
+                                      </p:to>
+                                    </p:set>
+                                    <p:animEffect transition="in" filter="fade">
+                                      <p:cBhvr>
+                                        <p:cTn id="18" dur="500"/>
+                                        <p:tgtEl>
+                                          <p:spTgt spid="7"/>
+                                        </p:tgtEl>
+                                      </p:cBhvr>
+                                    </p:animEffect>
+                                  </p:childTnLst>
+                                </p:cTn>
+                              </p:par>
+                            </p:childTnLst>
+                          </p:cTn>
+                        </p:par>
+                      </p:childTnLst>
+                    </p:cTn>
+                  </p:par>
+                  <p:par>
+                    <p:cTn id="19" fill="hold">
+                      <p:stCondLst>
+                        <p:cond delay="indefinite"/>
+                      </p:stCondLst>
+                      <p:childTnLst>
+                        <p:par>
+                          <p:cTn id="20" fill="hold">
+                            <p:stCondLst>
+                              <p:cond delay="0"/>
+                            </p:stCondLst>
+                            <p:childTnLst>
+                              <p:par>
+                                <p:cTn id="21" presetID="10" presetClass="entr" presetSubtype="0" fill="hold" grpId="0" nodeType="clickEffect">
+                                  <p:stCondLst>
+                                    <p:cond delay="0"/>
+                                  </p:stCondLst>
+                                  <p:childTnLst>
+                                    <p:set>
+                                      <p:cBhvr>
+                                        <p:cTn id="22" dur="1" fill="hold">
+                                          <p:stCondLst>
+                                            <p:cond delay="0"/>
+                                          </p:stCondLst>
+                                        </p:cTn>
+                                        <p:tgtEl>
+                                          <p:spTgt spid="23"/>
+                                        </p:tgtEl>
+                                        <p:attrNameLst>
+                                          <p:attrName>style.visibility</p:attrName>
+                                        </p:attrNameLst>
+                                      </p:cBhvr>
+                                      <p:to>
+                                        <p:strVal val="visible"/>
+                                      </p:to>
+                                    </p:set>
+                                    <p:animEffect transition="in" filter="fade">
+                                      <p:cBhvr>
+                                        <p:cTn id="23" dur="500"/>
+                                        <p:tgtEl>
+                                          <p:spTgt spid="23"/>
+                                        </p:tgtEl>
+                                      </p:cBhvr>
+                                    </p:animEffect>
+                                  </p:childTnLst>
+                                </p:cTn>
+                              </p:par>
+                              <p:par>
+                                <p:cTn id="24" presetID="10" presetClass="entr" presetSubtype="0" fill="hold" nodeType="withEffect">
+                                  <p:stCondLst>
+                                    <p:cond delay="0"/>
+                                  </p:stCondLst>
+                                  <p:childTnLst>
+                                    <p:set>
+                                      <p:cBhvr>
+                                        <p:cTn id="25" dur="1" fill="hold">
+                                          <p:stCondLst>
+                                            <p:cond delay="0"/>
+                                          </p:stCondLst>
+                                        </p:cTn>
+                                        <p:tgtEl>
+                                          <p:spTgt spid="24"/>
+                                        </p:tgtEl>
+                                        <p:attrNameLst>
+                                          <p:attrName>style.visibility</p:attrName>
+                                        </p:attrNameLst>
+                                      </p:cBhvr>
+                                      <p:to>
+                                        <p:strVal val="visible"/>
+                                      </p:to>
+                                    </p:set>
+                                    <p:animEffect transition="in" filter="fade">
+                                      <p:cBhvr>
+                                        <p:cTn id="26" dur="500"/>
+                                        <p:tgtEl>
+                                          <p:spTgt spid="24"/>
+                                        </p:tgtEl>
+                                      </p:cBhvr>
+                                    </p:animEffect>
+                                  </p:childTnLst>
+                                </p:cTn>
+                              </p:par>
+                            </p:childTnLst>
+                          </p:cTn>
+                        </p:par>
+                      </p:childTnLst>
+                    </p:cTn>
+                  </p:par>
+                  <p:par>
+                    <p:cTn id="27" fill="hold">
+                      <p:stCondLst>
+                        <p:cond delay="indefinite"/>
+                      </p:stCondLst>
+                      <p:childTnLst>
+                        <p:par>
+                          <p:cTn id="28" fill="hold">
+                            <p:stCondLst>
+                              <p:cond delay="0"/>
+                            </p:stCondLst>
+                            <p:childTnLst>
+                              <p:par>
+                                <p:cTn id="29" presetID="10" presetClass="entr" presetSubtype="0" fill="hold" grpId="0" nodeType="clickEffect">
+                                  <p:stCondLst>
+                                    <p:cond delay="0"/>
+                                  </p:stCondLst>
+                                  <p:childTnLst>
+                                    <p:set>
+                                      <p:cBhvr>
+                                        <p:cTn id="30" dur="1" fill="hold">
+                                          <p:stCondLst>
+                                            <p:cond delay="0"/>
+                                          </p:stCondLst>
+                                        </p:cTn>
+                                        <p:tgtEl>
+                                          <p:spTgt spid="28"/>
+                                        </p:tgtEl>
+                                        <p:attrNameLst>
+                                          <p:attrName>style.visibility</p:attrName>
+                                        </p:attrNameLst>
+                                      </p:cBhvr>
+                                      <p:to>
+                                        <p:strVal val="visible"/>
+                                      </p:to>
+                                    </p:set>
+                                    <p:animEffect transition="in" filter="fade">
+                                      <p:cBhvr>
+                                        <p:cTn id="31" dur="500"/>
+                                        <p:tgtEl>
+                                          <p:spTgt spid="28"/>
+                                        </p:tgtEl>
+                                      </p:cBhvr>
+                                    </p:animEffect>
+                                  </p:childTnLst>
+                                </p:cTn>
+                              </p:par>
+                              <p:par>
+                                <p:cTn id="32" presetID="10" presetClass="entr" presetSubtype="0" fill="hold" nodeType="withEffect">
+                                  <p:stCondLst>
+                                    <p:cond delay="0"/>
+                                  </p:stCondLst>
+                                  <p:childTnLst>
+                                    <p:set>
+                                      <p:cBhvr>
+                                        <p:cTn id="33" dur="1" fill="hold">
+                                          <p:stCondLst>
+                                            <p:cond delay="0"/>
+                                          </p:stCondLst>
+                                        </p:cTn>
+                                        <p:tgtEl>
+                                          <p:spTgt spid="10"/>
+                                        </p:tgtEl>
+                                        <p:attrNameLst>
+                                          <p:attrName>style.visibility</p:attrName>
+                                        </p:attrNameLst>
+                                      </p:cBhvr>
+                                      <p:to>
+                                        <p:strVal val="visible"/>
+                                      </p:to>
+                                    </p:set>
+                                    <p:animEffect transition="in" filter="fade">
+                                      <p:cBhvr>
+                                        <p:cTn id="34" dur="500"/>
+                                        <p:tgtEl>
+                                          <p:spTgt spid="10"/>
+                                        </p:tgtEl>
+                                      </p:cBhvr>
+                                    </p:animEffect>
+                                  </p:childTnLst>
+                                </p:cTn>
+                              </p:par>
+                            </p:childTnLst>
+                          </p:cTn>
+                        </p:par>
+                      </p:childTnLst>
+                    </p:cTn>
+                  </p:par>
+                  <p:par>
+                    <p:cTn id="35" fill="hold">
+                      <p:stCondLst>
+                        <p:cond delay="indefinite"/>
+                      </p:stCondLst>
+                      <p:childTnLst>
+                        <p:par>
+                          <p:cTn id="36" fill="hold">
+                            <p:stCondLst>
+                              <p:cond delay="0"/>
+                            </p:stCondLst>
+                            <p:childTnLst>
+                              <p:par>
+                                <p:cTn id="37" presetID="10" presetClass="entr" presetSubtype="0" fill="hold" grpId="0" nodeType="clickEffect">
+                                  <p:stCondLst>
+                                    <p:cond delay="0"/>
+                                  </p:stCondLst>
+                                  <p:childTnLst>
+                                    <p:set>
+                                      <p:cBhvr>
+                                        <p:cTn id="38" dur="1" fill="hold">
+                                          <p:stCondLst>
+                                            <p:cond delay="0"/>
+                                          </p:stCondLst>
+                                        </p:cTn>
+                                        <p:tgtEl>
+                                          <p:spTgt spid="30"/>
+                                        </p:tgtEl>
+                                        <p:attrNameLst>
+                                          <p:attrName>style.visibility</p:attrName>
+                                        </p:attrNameLst>
+                                      </p:cBhvr>
+                                      <p:to>
+                                        <p:strVal val="visible"/>
+                                      </p:to>
+                                    </p:set>
+                                    <p:animEffect transition="in" filter="fade">
+                                      <p:cBhvr>
+                                        <p:cTn id="39" dur="500"/>
+                                        <p:tgtEl>
+                                          <p:spTgt spid="30"/>
+                                        </p:tgtEl>
+                                      </p:cBhvr>
+                                    </p:animEffect>
+                                  </p:childTnLst>
+                                </p:cTn>
+                              </p:par>
+                              <p:par>
+                                <p:cTn id="40" presetID="10" presetClass="entr" presetSubtype="0" fill="hold" nodeType="withEffect">
+                                  <p:stCondLst>
+                                    <p:cond delay="0"/>
+                                  </p:stCondLst>
+                                  <p:childTnLst>
+                                    <p:set>
+                                      <p:cBhvr>
+                                        <p:cTn id="41" dur="1" fill="hold">
+                                          <p:stCondLst>
+                                            <p:cond delay="0"/>
+                                          </p:stCondLst>
+                                        </p:cTn>
+                                        <p:tgtEl>
+                                          <p:spTgt spid="29"/>
+                                        </p:tgtEl>
+                                        <p:attrNameLst>
+                                          <p:attrName>style.visibility</p:attrName>
+                                        </p:attrNameLst>
+                                      </p:cBhvr>
+                                      <p:to>
+                                        <p:strVal val="visible"/>
+                                      </p:to>
+                                    </p:set>
+                                    <p:animEffect transition="in" filter="fade">
+                                      <p:cBhvr>
+                                        <p:cTn id="42" dur="500"/>
+                                        <p:tgtEl>
+                                          <p:spTgt spid="29"/>
+                                        </p:tgtEl>
+                                      </p:cBhvr>
+                                    </p:animEffect>
+                                  </p:childTnLst>
+                                </p:cTn>
+                              </p:par>
+                            </p:childTnLst>
+                          </p:cTn>
+                        </p:par>
+                      </p:childTnLst>
+                    </p:cTn>
+                  </p:par>
+                  <p:par>
+                    <p:cTn id="43" fill="hold">
+                      <p:stCondLst>
+                        <p:cond delay="indefinite"/>
+                      </p:stCondLst>
+                      <p:childTnLst>
+                        <p:par>
+                          <p:cTn id="44" fill="hold">
+                            <p:stCondLst>
+                              <p:cond delay="0"/>
+                            </p:stCondLst>
+                            <p:childTnLst>
+                              <p:par>
+                                <p:cTn id="45" presetID="10" presetClass="entr" presetSubtype="0" fill="hold" grpId="0" nodeType="clickEffect">
+                                  <p:stCondLst>
+                                    <p:cond delay="0"/>
+                                  </p:stCondLst>
+                                  <p:childTnLst>
+                                    <p:set>
+                                      <p:cBhvr>
+                                        <p:cTn id="46" dur="1" fill="hold">
+                                          <p:stCondLst>
+                                            <p:cond delay="0"/>
+                                          </p:stCondLst>
+                                        </p:cTn>
+                                        <p:tgtEl>
+                                          <p:spTgt spid="36"/>
+                                        </p:tgtEl>
+                                        <p:attrNameLst>
+                                          <p:attrName>style.visibility</p:attrName>
+                                        </p:attrNameLst>
+                                      </p:cBhvr>
+                                      <p:to>
+                                        <p:strVal val="visible"/>
+                                      </p:to>
+                                    </p:set>
+                                    <p:animEffect transition="in" filter="fade">
+                                      <p:cBhvr>
+                                        <p:cTn id="47" dur="500"/>
+                                        <p:tgtEl>
+                                          <p:spTgt spid="36"/>
+                                        </p:tgtEl>
+                                      </p:cBhvr>
+                                    </p:animEffect>
+                                  </p:childTnLst>
+                                </p:cTn>
+                              </p:par>
+                              <p:par>
+                                <p:cTn id="48" presetID="10" presetClass="entr" presetSubtype="0" fill="hold" nodeType="withEffect">
+                                  <p:stCondLst>
+                                    <p:cond delay="0"/>
+                                  </p:stCondLst>
+                                  <p:childTnLst>
+                                    <p:set>
+                                      <p:cBhvr>
+                                        <p:cTn id="49" dur="1" fill="hold">
+                                          <p:stCondLst>
+                                            <p:cond delay="0"/>
+                                          </p:stCondLst>
+                                        </p:cTn>
+                                        <p:tgtEl>
+                                          <p:spTgt spid="35"/>
+                                        </p:tgtEl>
+                                        <p:attrNameLst>
+                                          <p:attrName>style.visibility</p:attrName>
+                                        </p:attrNameLst>
+                                      </p:cBhvr>
+                                      <p:to>
+                                        <p:strVal val="visible"/>
+                                      </p:to>
+                                    </p:set>
+                                    <p:animEffect transition="in" filter="fade">
+                                      <p:cBhvr>
+                                        <p:cTn id="50" dur="500"/>
+                                        <p:tgtEl>
+                                          <p:spTgt spid="35"/>
+                                        </p:tgtEl>
+                                      </p:cBhvr>
+                                    </p:animEffect>
+                                  </p:childTnLst>
+                                </p:cTn>
+                              </p:par>
+                            </p:childTnLst>
+                          </p:cTn>
+                        </p:par>
+                      </p:childTnLst>
+                    </p:cTn>
+                  </p:par>
+                </p:childTnLst>
+              </p:cTn>
+              <p:prevCondLst>
+                <p:cond evt="onPrev" delay="0">
+                  <p:tgtEl>
+                    <p:sldTgt/>
+                  </p:tgtEl>
+                </p:cond>
+              </p:prevCondLst>
+              <p:nextCondLst>
+                <p:cond evt="onNext" delay="0">
+                  <p:tgtEl>
+                    <p:sldTgt/>
+                  </p:tgtEl>
+                </p:cond>
+              </p:nextCondLst>
+            </p:seq>
+          </p:childTnLst>
+        </p:cTn>
+      </p:par>
+    </p:tnLst>
+    <p:bldLst>
+      <p:bldP spid="21" grpId="0"/>
+      <p:bldP spid="22" grpId="0"/>
+      <p:bldP spid="23" grpId="0"/>
+      <p:bldP spid="28" grpId="0"/>
+      <p:bldP spid="30" grpId="0"/>
+      <p:bldP spid="36" grpId="0"/>
+    </p:bldLst>
+  </p:timing>
+</p:sld>
+</file>
+
+<file path=ppt/slides/slide14.xml><?xml version="1.0" encoding="utf-8"?>
+<p:sld xmlns:a="http://schemas.openxmlformats.org/drawingml/2006/main" xmlns:r="http://schemas.openxmlformats.org/officeDocument/2006/relationships" xmlns:p="http://schemas.openxmlformats.org/presentationml/2006/main">
+  <p:cSld>
+    <p:bg>
+      <p:bgPr>
+        <a:solidFill>
+          <a:schemeClr val="bg2">
+            <a:lumMod val="85000"/>
+            <a:alpha val="80000"/>
+          </a:schemeClr>
+        </a:solidFill>
+        <a:effectLst/>
+      </p:bgPr>
+    </p:bg>
+    <p:spTree>
+      <p:nvGrpSpPr>
+        <p:cNvPr id="1" name=""/>
+        <p:cNvGrpSpPr/>
+        <p:nvPr/>
+      </p:nvGrpSpPr>
+      <p:grpSpPr>
+        <a:xfrm>
+          <a:off x="0" y="0"/>
+          <a:ext cx="0" cy="0"/>
+          <a:chOff x="0" y="0"/>
+          <a:chExt cx="0" cy="0"/>
+        </a:xfrm>
+      </p:grpSpPr>
+      <p:sp>
+        <p:nvSpPr>
+          <p:cNvPr id="91" name="TextBox 90"/>
+          <p:cNvSpPr txBox="1"/>
+          <p:nvPr/>
+        </p:nvSpPr>
+        <p:spPr>
+          <a:xfrm>
+            <a:off x="7856938" y="225155"/>
+            <a:ext cx="8663782" cy="1277594"/>
+          </a:xfrm>
+          <a:prstGeom prst="rect">
+            <a:avLst/>
+          </a:prstGeom>
+          <a:noFill/>
+        </p:spPr>
+        <p:txBody>
+          <a:bodyPr wrap="none" rtlCol="0">
+            <a:spAutoFit/>
+          </a:bodyPr>
+          <a:lstStyle/>
+          <a:p>
+            <a:pPr marL="0" marR="0" lvl="0" indent="0" algn="ctr" defTabSz="1828434" rtl="0" eaLnBrk="1" fontAlgn="auto" latinLnBrk="0" hangingPunct="1">
+              <a:lnSpc>
+                <a:spcPts val="10000"/>
+              </a:lnSpc>
+              <a:spcBef>
+                <a:spcPts val="0"/>
+              </a:spcBef>
+              <a:spcAft>
+                <a:spcPts val="0"/>
+              </a:spcAft>
+              <a:buClrTx/>
+              <a:buSzTx/>
+              <a:buFontTx/>
+              <a:buNone/>
+              <a:tabLst/>
+              <a:defRPr/>
+            </a:pPr>
+            <a:r>
+              <a:rPr kumimoji="0" lang="el-GR" sz="6600" b="1" i="0" u="none" strike="noStrike" kern="1200" cap="none" spc="0" normalizeH="0" baseline="0" noProof="0" dirty="0">
+                <a:ln>
+                  <a:noFill/>
+                </a:ln>
+                <a:solidFill>
+                  <a:srgbClr val="445469"/>
+                </a:solidFill>
+                <a:effectLst/>
+                <a:uLnTx/>
+                <a:uFillTx/>
+                <a:latin typeface="Montserrat Bold" charset="0"/>
+                <a:ea typeface="Montserrat Bold" charset="0"/>
+                <a:cs typeface="Montserrat Bold" charset="0"/>
+              </a:rPr>
+              <a:t>ΘΕΩΡΗΤΙΚΟ ΥΠΟΒΑΘΡΟ</a:t>
+            </a:r>
+          </a:p>
+        </p:txBody>
+      </p:sp>
+      <p:sp>
+        <p:nvSpPr>
+          <p:cNvPr id="92" name="TextBox 91"/>
+          <p:cNvSpPr txBox="1"/>
+          <p:nvPr/>
+        </p:nvSpPr>
+        <p:spPr>
+          <a:xfrm>
+            <a:off x="9587436" y="1414546"/>
+            <a:ext cx="5199052" cy="584775"/>
+          </a:xfrm>
+          <a:prstGeom prst="rect">
+            <a:avLst/>
+          </a:prstGeom>
+          <a:noFill/>
+        </p:spPr>
+        <p:txBody>
+          <a:bodyPr wrap="none" rtlCol="0" anchor="ctr" anchorCtr="0">
+            <a:spAutoFit/>
+          </a:bodyPr>
+          <a:lstStyle/>
+          <a:p>
+            <a:pPr marL="0" marR="0" lvl="0" indent="0" algn="ctr" defTabSz="1828434" rtl="0" eaLnBrk="1" fontAlgn="auto" latinLnBrk="0" hangingPunct="1">
+              <a:lnSpc>
+                <a:spcPct val="100000"/>
+              </a:lnSpc>
+              <a:spcBef>
+                <a:spcPts val="0"/>
+              </a:spcBef>
+              <a:spcAft>
+                <a:spcPts val="0"/>
+              </a:spcAft>
+              <a:buClrTx/>
+              <a:buSzTx/>
+              <a:buFontTx/>
+              <a:buNone/>
+              <a:tabLst/>
+              <a:defRPr/>
+            </a:pPr>
+            <a:r>
+              <a:rPr kumimoji="0" lang="el-GR" sz="3200" b="0" i="0" u="none" strike="noStrike" kern="1200" cap="none" spc="0" normalizeH="0" baseline="0" noProof="0" dirty="0">
+                <a:ln>
+                  <a:noFill/>
+                </a:ln>
+                <a:solidFill>
+                  <a:srgbClr val="FFFFFF">
+                    <a:lumMod val="65000"/>
+                  </a:srgbClr>
+                </a:solidFill>
+                <a:effectLst/>
+                <a:uLnTx/>
+                <a:uFillTx/>
+                <a:latin typeface="Montserrat Light" charset="0"/>
+                <a:ea typeface="Montserrat Light" charset="0"/>
+                <a:cs typeface="Montserrat Light" charset="0"/>
+              </a:rPr>
+              <a:t>Υλικός Εξοπλισμός - </a:t>
+            </a:r>
+            <a:r>
+              <a:rPr kumimoji="0" lang="en-US" sz="3200" b="0" i="0" u="none" strike="noStrike" kern="1200" cap="none" spc="0" normalizeH="0" baseline="0" noProof="0" dirty="0">
+                <a:ln>
+                  <a:noFill/>
+                </a:ln>
+                <a:solidFill>
+                  <a:srgbClr val="FFFFFF">
+                    <a:lumMod val="65000"/>
+                  </a:srgbClr>
+                </a:solidFill>
+                <a:effectLst/>
+                <a:uLnTx/>
+                <a:uFillTx/>
+                <a:latin typeface="Montserrat Light" charset="0"/>
+                <a:ea typeface="Montserrat Light" charset="0"/>
+                <a:cs typeface="Montserrat Light" charset="0"/>
+              </a:rPr>
+              <a:t>Hardware</a:t>
+            </a:r>
+          </a:p>
+        </p:txBody>
+      </p:sp>
+      <p:grpSp>
+        <p:nvGrpSpPr>
+          <p:cNvPr id="9" name="Ομάδα 8">
+            <a:extLst>
+              <a:ext uri="{FF2B5EF4-FFF2-40B4-BE49-F238E27FC236}">
+                <a16:creationId xmlns:a16="http://schemas.microsoft.com/office/drawing/2014/main" id="{F19751C3-566B-4536-A57B-692D5F2C725B}"/>
+              </a:ext>
+            </a:extLst>
+          </p:cNvPr>
+          <p:cNvGrpSpPr/>
+          <p:nvPr/>
+        </p:nvGrpSpPr>
+        <p:grpSpPr>
+          <a:xfrm>
+            <a:off x="731067" y="11874650"/>
+            <a:ext cx="23510531" cy="1871976"/>
+            <a:chOff x="731067" y="11874650"/>
+            <a:chExt cx="23510531" cy="1871976"/>
+          </a:xfrm>
+        </p:grpSpPr>
+        <p:sp>
+          <p:nvSpPr>
+            <p:cNvPr id="25" name="Rectangle 9">
+              <a:extLst>
+                <a:ext uri="{FF2B5EF4-FFF2-40B4-BE49-F238E27FC236}">
+                  <a16:creationId xmlns:a16="http://schemas.microsoft.com/office/drawing/2014/main" id="{9D1B4304-7FA6-7B43-B5BF-5AFDD8787BDB}"/>
+                </a:ext>
+              </a:extLst>
+            </p:cNvPr>
+            <p:cNvSpPr/>
+            <p:nvPr/>
+          </p:nvSpPr>
+          <p:spPr>
+            <a:xfrm rot="10800000" flipV="1">
+              <a:off x="754506" y="11874650"/>
+              <a:ext cx="4511808" cy="93485"/>
+            </a:xfrm>
+            <a:prstGeom prst="rect">
+              <a:avLst/>
+            </a:prstGeom>
+            <a:solidFill>
+              <a:srgbClr val="009FCF"/>
+            </a:solidFill>
+            <a:ln>
+              <a:noFill/>
+            </a:ln>
+          </p:spPr>
+          <p:style>
+            <a:lnRef idx="2">
+              <a:schemeClr val="accent1">
+                <a:shade val="50000"/>
+              </a:schemeClr>
+            </a:lnRef>
+            <a:fillRef idx="1">
+              <a:schemeClr val="accent1"/>
+            </a:fillRef>
+            <a:effectRef idx="0">
+              <a:schemeClr val="accent1"/>
+            </a:effectRef>
+            <a:fontRef idx="minor">
+              <a:schemeClr val="lt1"/>
+            </a:fontRef>
+          </p:style>
+          <p:txBody>
+            <a:bodyPr rtlCol="0" anchor="ctr"/>
+            <a:lstStyle>
+              <a:defPPr>
+                <a:defRPr lang="en-US"/>
+              </a:defPPr>
+              <a:lvl1pPr marL="0" algn="l" defTabSz="1828434" rtl="0" eaLnBrk="1" latinLnBrk="0" hangingPunct="1">
+                <a:defRPr sz="3600" kern="1200">
+                  <a:solidFill>
+                    <a:schemeClr val="lt1"/>
+                  </a:solidFill>
+                  <a:latin typeface="+mn-lt"/>
+                  <a:ea typeface="+mn-ea"/>
+                  <a:cs typeface="+mn-cs"/>
+                </a:defRPr>
+              </a:lvl1pPr>
+              <a:lvl2pPr marL="914217" algn="l" defTabSz="1828434" rtl="0" eaLnBrk="1" latinLnBrk="0" hangingPunct="1">
+                <a:defRPr sz="3600" kern="1200">
+                  <a:solidFill>
+                    <a:schemeClr val="lt1"/>
+                  </a:solidFill>
+                  <a:latin typeface="+mn-lt"/>
+                  <a:ea typeface="+mn-ea"/>
+                  <a:cs typeface="+mn-cs"/>
+                </a:defRPr>
+              </a:lvl2pPr>
+              <a:lvl3pPr marL="1828434" algn="l" defTabSz="1828434" rtl="0" eaLnBrk="1" latinLnBrk="0" hangingPunct="1">
+                <a:defRPr sz="3600" kern="1200">
+                  <a:solidFill>
+                    <a:schemeClr val="lt1"/>
+                  </a:solidFill>
+                  <a:latin typeface="+mn-lt"/>
+                  <a:ea typeface="+mn-ea"/>
+                  <a:cs typeface="+mn-cs"/>
+                </a:defRPr>
+              </a:lvl3pPr>
+              <a:lvl4pPr marL="2742651" algn="l" defTabSz="1828434" rtl="0" eaLnBrk="1" latinLnBrk="0" hangingPunct="1">
+                <a:defRPr sz="3600" kern="1200">
+                  <a:solidFill>
+                    <a:schemeClr val="lt1"/>
+                  </a:solidFill>
+                  <a:latin typeface="+mn-lt"/>
+                  <a:ea typeface="+mn-ea"/>
+                  <a:cs typeface="+mn-cs"/>
+                </a:defRPr>
+              </a:lvl4pPr>
+              <a:lvl5pPr marL="3656868" algn="l" defTabSz="1828434" rtl="0" eaLnBrk="1" latinLnBrk="0" hangingPunct="1">
+                <a:defRPr sz="3600" kern="1200">
+                  <a:solidFill>
+                    <a:schemeClr val="lt1"/>
+                  </a:solidFill>
+                  <a:latin typeface="+mn-lt"/>
+                  <a:ea typeface="+mn-ea"/>
+                  <a:cs typeface="+mn-cs"/>
+                </a:defRPr>
+              </a:lvl5pPr>
+              <a:lvl6pPr marL="4571086" algn="l" defTabSz="1828434" rtl="0" eaLnBrk="1" latinLnBrk="0" hangingPunct="1">
+                <a:defRPr sz="3600" kern="1200">
+                  <a:solidFill>
+                    <a:schemeClr val="lt1"/>
+                  </a:solidFill>
+                  <a:latin typeface="+mn-lt"/>
+                  <a:ea typeface="+mn-ea"/>
+                  <a:cs typeface="+mn-cs"/>
+                </a:defRPr>
+              </a:lvl6pPr>
+              <a:lvl7pPr marL="5485303" algn="l" defTabSz="1828434" rtl="0" eaLnBrk="1" latinLnBrk="0" hangingPunct="1">
+                <a:defRPr sz="3600" kern="1200">
+                  <a:solidFill>
+                    <a:schemeClr val="lt1"/>
+                  </a:solidFill>
+                  <a:latin typeface="+mn-lt"/>
+                  <a:ea typeface="+mn-ea"/>
+                  <a:cs typeface="+mn-cs"/>
+                </a:defRPr>
+              </a:lvl7pPr>
+              <a:lvl8pPr marL="6399520" algn="l" defTabSz="1828434" rtl="0" eaLnBrk="1" latinLnBrk="0" hangingPunct="1">
+                <a:defRPr sz="3600" kern="1200">
+                  <a:solidFill>
+                    <a:schemeClr val="lt1"/>
+                  </a:solidFill>
+                  <a:latin typeface="+mn-lt"/>
+                  <a:ea typeface="+mn-ea"/>
+                  <a:cs typeface="+mn-cs"/>
+                </a:defRPr>
+              </a:lvl8pPr>
+              <a:lvl9pPr marL="7313737" algn="l" defTabSz="1828434" rtl="0" eaLnBrk="1" latinLnBrk="0" hangingPunct="1">
+                <a:defRPr sz="3600" kern="1200">
+                  <a:solidFill>
+                    <a:schemeClr val="lt1"/>
+                  </a:solidFill>
+                  <a:latin typeface="+mn-lt"/>
+                  <a:ea typeface="+mn-ea"/>
+                  <a:cs typeface="+mn-cs"/>
+                </a:defRPr>
+              </a:lvl9pPr>
+            </a:lstStyle>
+            <a:p>
+              <a:pPr marL="0" marR="0" lvl="0" indent="0" algn="ctr" defTabSz="1828434" rtl="0" eaLnBrk="1" fontAlgn="auto" latinLnBrk="0" hangingPunct="1">
+                <a:lnSpc>
+                  <a:spcPct val="100000"/>
+                </a:lnSpc>
+                <a:spcBef>
+                  <a:spcPts val="0"/>
+                </a:spcBef>
+                <a:spcAft>
+                  <a:spcPts val="0"/>
+                </a:spcAft>
+                <a:buClrTx/>
+                <a:buSzTx/>
+                <a:buFontTx/>
+                <a:buNone/>
+                <a:tabLst/>
+                <a:defRPr/>
+              </a:pPr>
+              <a:endParaRPr kumimoji="0" lang="en-US" sz="3600" b="0" i="0" u="none" strike="noStrike" kern="1200" cap="none" spc="0" normalizeH="0" baseline="0" noProof="0">
+                <a:ln>
+                  <a:noFill/>
+                </a:ln>
+                <a:solidFill>
+                  <a:srgbClr val="FFFFFF"/>
+                </a:solidFill>
+                <a:effectLst/>
+                <a:uLnTx/>
+                <a:uFillTx/>
+                <a:latin typeface="Roboto" panose="02000000000000000000" pitchFamily="2" charset="0"/>
+                <a:ea typeface="Roboto" panose="02000000000000000000" pitchFamily="2" charset="0"/>
+                <a:cs typeface="+mn-cs"/>
+              </a:endParaRPr>
+            </a:p>
+          </p:txBody>
+        </p:sp>
+        <p:sp>
+          <p:nvSpPr>
+            <p:cNvPr id="27" name="TextBox 26">
+              <a:extLst>
+                <a:ext uri="{FF2B5EF4-FFF2-40B4-BE49-F238E27FC236}">
+                  <a16:creationId xmlns:a16="http://schemas.microsoft.com/office/drawing/2014/main" id="{F601E20D-2E49-4DBB-8B5E-E656FFD822F9}"/>
+                </a:ext>
+              </a:extLst>
+            </p:cNvPr>
+            <p:cNvSpPr txBox="1"/>
+            <p:nvPr/>
+          </p:nvSpPr>
+          <p:spPr>
+            <a:xfrm>
+              <a:off x="731067" y="12455581"/>
+              <a:ext cx="3516412" cy="553998"/>
+            </a:xfrm>
+            <a:prstGeom prst="rect">
+              <a:avLst/>
+            </a:prstGeom>
+            <a:noFill/>
+          </p:spPr>
+          <p:txBody>
+            <a:bodyPr wrap="none" rtlCol="0" anchor="ctr" anchorCtr="0">
+              <a:spAutoFit/>
+            </a:bodyPr>
+            <a:lstStyle/>
+            <a:p>
+              <a:pPr marL="0" marR="0" lvl="0" indent="0" algn="l" defTabSz="1828434" rtl="0" eaLnBrk="1" fontAlgn="auto" latinLnBrk="0" hangingPunct="1">
+                <a:lnSpc>
+                  <a:spcPct val="100000"/>
+                </a:lnSpc>
+                <a:spcBef>
+                  <a:spcPts val="0"/>
+                </a:spcBef>
+                <a:spcAft>
+                  <a:spcPts val="0"/>
+                </a:spcAft>
+                <a:buClrTx/>
+                <a:buSzTx/>
+                <a:buFontTx/>
+                <a:buNone/>
+                <a:tabLst/>
+                <a:defRPr/>
+              </a:pPr>
+              <a:r>
+                <a:rPr kumimoji="0" lang="el-GR" sz="3000" b="1" i="0" u="none" strike="noStrike" kern="1200" cap="none" spc="0" normalizeH="0" baseline="0" noProof="0" dirty="0">
+                  <a:ln>
+                    <a:noFill/>
+                  </a:ln>
+                  <a:solidFill>
+                    <a:srgbClr val="445469"/>
+                  </a:solidFill>
+                  <a:effectLst/>
+                  <a:uLnTx/>
+                  <a:uFillTx/>
+                  <a:latin typeface="Montserrat Bold" charset="0"/>
+                  <a:ea typeface="Montserrat Bold" charset="0"/>
+                  <a:cs typeface="Montserrat Bold" charset="0"/>
+                </a:rPr>
+                <a:t>Τίτλος διπλωματικής</a:t>
+              </a:r>
+            </a:p>
+          </p:txBody>
+        </p:sp>
+        <p:pic>
+          <p:nvPicPr>
+            <p:cNvPr id="32" name="Picture 1">
+              <a:extLst>
+                <a:ext uri="{FF2B5EF4-FFF2-40B4-BE49-F238E27FC236}">
+                  <a16:creationId xmlns:a16="http://schemas.microsoft.com/office/drawing/2014/main" id="{BD22357C-0719-444A-BD6F-5C3712ED167F}"/>
+                </a:ext>
+              </a:extLst>
+            </p:cNvPr>
+            <p:cNvPicPr>
+              <a:picLocks noChangeAspect="1" noChangeArrowheads="1"/>
+            </p:cNvPicPr>
+            <p:nvPr/>
+          </p:nvPicPr>
+          <p:blipFill>
+            <a:blip r:embed="rId3">
+              <a:extLst>
+                <a:ext uri="{28A0092B-C50C-407E-A947-70E740481C1C}">
+                  <a14:useLocalDpi xmlns:a14="http://schemas.microsoft.com/office/drawing/2010/main" val="0"/>
+                </a:ext>
+              </a:extLst>
+            </a:blip>
+            <a:srcRect l="9007" r="18660"/>
+            <a:stretch>
+              <a:fillRect/>
+            </a:stretch>
+          </p:blipFill>
+          <p:spPr bwMode="auto">
+            <a:xfrm>
+              <a:off x="22403659" y="11874650"/>
+              <a:ext cx="1837939" cy="1871976"/>
+            </a:xfrm>
+            <a:prstGeom prst="rect">
+              <a:avLst/>
+            </a:prstGeom>
+            <a:noFill/>
+            <a:extLst>
+              <a:ext uri="{909E8E84-426E-40DD-AFC4-6F175D3DCCD1}">
+                <a14:hiddenFill xmlns:a14="http://schemas.microsoft.com/office/drawing/2010/main">
+                  <a:solidFill>
+                    <a:srgbClr val="FFFFFF"/>
+                  </a:solidFill>
+                </a14:hiddenFill>
+              </a:ext>
+            </a:extLst>
+          </p:spPr>
+        </p:pic>
+        <p:sp>
+          <p:nvSpPr>
+            <p:cNvPr id="33" name="TextBox 32">
+              <a:extLst>
+                <a:ext uri="{FF2B5EF4-FFF2-40B4-BE49-F238E27FC236}">
+                  <a16:creationId xmlns:a16="http://schemas.microsoft.com/office/drawing/2014/main" id="{2DB92BB1-212A-460B-9B3B-84E54D2DBC6E}"/>
+                </a:ext>
+              </a:extLst>
+            </p:cNvPr>
+            <p:cNvSpPr txBox="1"/>
+            <p:nvPr/>
+          </p:nvSpPr>
+          <p:spPr>
+            <a:xfrm>
+              <a:off x="17105150" y="12302806"/>
+              <a:ext cx="5298509" cy="1015663"/>
+            </a:xfrm>
+            <a:prstGeom prst="rect">
+              <a:avLst/>
+            </a:prstGeom>
+            <a:noFill/>
+          </p:spPr>
+          <p:txBody>
+            <a:bodyPr wrap="square" rtlCol="0">
+              <a:spAutoFit/>
+            </a:bodyPr>
+            <a:lstStyle/>
+            <a:p>
+              <a:pPr marL="0" marR="0" lvl="0" indent="0" algn="r" defTabSz="1828434" rtl="0" eaLnBrk="1" fontAlgn="auto" latinLnBrk="0" hangingPunct="1">
+                <a:lnSpc>
+                  <a:spcPct val="100000"/>
+                </a:lnSpc>
+                <a:spcBef>
+                  <a:spcPts val="0"/>
+                </a:spcBef>
+                <a:spcAft>
+                  <a:spcPts val="0"/>
+                </a:spcAft>
+                <a:buClrTx/>
+                <a:buSzTx/>
+                <a:buFontTx/>
+                <a:buNone/>
+                <a:tabLst/>
+                <a:defRPr/>
+              </a:pPr>
+              <a:r>
+                <a:rPr kumimoji="0" lang="el-GR" sz="3000" b="1" i="0" u="none" strike="noStrike" kern="1200" cap="none" spc="0" normalizeH="0" baseline="0" noProof="0" dirty="0">
+                  <a:ln>
+                    <a:noFill/>
+                  </a:ln>
+                  <a:solidFill>
+                    <a:srgbClr val="445469"/>
+                  </a:solidFill>
+                  <a:effectLst/>
+                  <a:uLnTx/>
+                  <a:uFillTx/>
+                  <a:latin typeface="Calibri" panose="020F0502020204030204"/>
+                  <a:ea typeface="+mn-ea"/>
+                  <a:cs typeface="+mn-cs"/>
+                </a:rPr>
+                <a:t>Μησσήν Στέφανος</a:t>
+              </a:r>
+              <a:endParaRPr kumimoji="0" lang="el-GR" sz="3000" b="1" i="1" u="none" strike="noStrike" kern="1200" cap="none" spc="0" normalizeH="0" baseline="0" noProof="0" dirty="0">
+                <a:ln>
+                  <a:noFill/>
+                </a:ln>
+                <a:solidFill>
+                  <a:srgbClr val="445469"/>
+                </a:solidFill>
+                <a:effectLst/>
+                <a:uLnTx/>
+                <a:uFillTx/>
+                <a:latin typeface="Calibri" panose="020F0502020204030204"/>
+                <a:ea typeface="+mn-ea"/>
+                <a:cs typeface="+mn-cs"/>
+              </a:endParaRPr>
+            </a:p>
+            <a:p>
+              <a:pPr marL="0" marR="0" lvl="0" indent="0" algn="r" defTabSz="1828434" rtl="0" eaLnBrk="1" fontAlgn="auto" latinLnBrk="0" hangingPunct="1">
+                <a:lnSpc>
+                  <a:spcPct val="100000"/>
+                </a:lnSpc>
+                <a:spcBef>
+                  <a:spcPts val="0"/>
+                </a:spcBef>
+                <a:spcAft>
+                  <a:spcPts val="0"/>
+                </a:spcAft>
+                <a:buClrTx/>
+                <a:buSzTx/>
+                <a:buFontTx/>
+                <a:buNone/>
+                <a:tabLst/>
+                <a:defRPr/>
+              </a:pPr>
+              <a:r>
+                <a:rPr kumimoji="0" lang="el-GR" sz="3000" b="1" i="1" u="none" strike="noStrike" kern="1200" cap="none" spc="0" normalizeH="0" baseline="0" noProof="0" dirty="0">
+                  <a:ln>
+                    <a:noFill/>
+                  </a:ln>
+                  <a:solidFill>
+                    <a:srgbClr val="445469"/>
+                  </a:solidFill>
+                  <a:effectLst/>
+                  <a:uLnTx/>
+                  <a:uFillTx/>
+                  <a:latin typeface="Calibri" panose="020F0502020204030204"/>
+                  <a:ea typeface="+mn-ea"/>
+                  <a:cs typeface="+mn-cs"/>
+                </a:rPr>
+                <a:t>Α</a:t>
+              </a:r>
+              <a:r>
+                <a:rPr kumimoji="0" lang="en-US" sz="3000" b="1" i="1" u="none" strike="noStrike" kern="1200" cap="none" spc="0" normalizeH="0" baseline="0" noProof="0" dirty="0">
+                  <a:ln>
+                    <a:noFill/>
+                  </a:ln>
+                  <a:solidFill>
+                    <a:srgbClr val="445469"/>
+                  </a:solidFill>
+                  <a:effectLst/>
+                  <a:uLnTx/>
+                  <a:uFillTx/>
+                  <a:latin typeface="Montserrat Bold"/>
+                  <a:ea typeface="+mn-ea"/>
+                  <a:cs typeface="+mn-cs"/>
+                </a:rPr>
+                <a:t>.</a:t>
+              </a:r>
+              <a:r>
+                <a:rPr kumimoji="0" lang="el-GR" sz="3000" b="1" i="1" u="none" strike="noStrike" kern="1200" cap="none" spc="0" normalizeH="0" baseline="0" noProof="0" dirty="0">
+                  <a:ln>
+                    <a:noFill/>
+                  </a:ln>
+                  <a:solidFill>
+                    <a:srgbClr val="445469"/>
+                  </a:solidFill>
+                  <a:effectLst/>
+                  <a:uLnTx/>
+                  <a:uFillTx/>
+                  <a:latin typeface="Calibri" panose="020F0502020204030204"/>
+                  <a:ea typeface="+mn-ea"/>
+                  <a:cs typeface="+mn-cs"/>
+                </a:rPr>
+                <a:t>Μ</a:t>
+              </a:r>
+              <a:r>
+                <a:rPr kumimoji="0" lang="en-US" sz="3000" b="1" i="1" u="none" strike="noStrike" kern="1200" cap="none" spc="0" normalizeH="0" baseline="0" noProof="0" dirty="0">
+                  <a:ln>
+                    <a:noFill/>
+                  </a:ln>
+                  <a:solidFill>
+                    <a:srgbClr val="445469"/>
+                  </a:solidFill>
+                  <a:effectLst/>
+                  <a:uLnTx/>
+                  <a:uFillTx/>
+                  <a:latin typeface="Montserrat Bold"/>
+                  <a:ea typeface="+mn-ea"/>
+                  <a:cs typeface="+mn-cs"/>
+                </a:rPr>
+                <a:t>.: 91432</a:t>
+              </a:r>
+              <a:endParaRPr kumimoji="0" lang="el-GR" sz="3000" b="1" i="1" u="none" strike="noStrike" kern="1200" cap="none" spc="0" normalizeH="0" baseline="0" noProof="0" dirty="0">
+                <a:ln>
+                  <a:noFill/>
+                </a:ln>
+                <a:solidFill>
+                  <a:srgbClr val="445469"/>
+                </a:solidFill>
+                <a:effectLst/>
+                <a:uLnTx/>
+                <a:uFillTx/>
+                <a:latin typeface="Calibri" panose="020F0502020204030204"/>
+                <a:ea typeface="+mn-ea"/>
+                <a:cs typeface="+mn-cs"/>
+              </a:endParaRPr>
+            </a:p>
+          </p:txBody>
+        </p:sp>
+      </p:grpSp>
+      <p:pic>
+        <p:nvPicPr>
+          <p:cNvPr id="15" name="Εικόνα 14">
+            <a:extLst>
+              <a:ext uri="{FF2B5EF4-FFF2-40B4-BE49-F238E27FC236}">
+                <a16:creationId xmlns:a16="http://schemas.microsoft.com/office/drawing/2014/main" id="{F5F365AC-8F14-4502-B120-FF272BAA2DB8}"/>
+              </a:ext>
+            </a:extLst>
+          </p:cNvPr>
+          <p:cNvPicPr>
+            <a:picLocks noChangeAspect="1"/>
+          </p:cNvPicPr>
+          <p:nvPr/>
+        </p:nvPicPr>
+        <p:blipFill>
+          <a:blip r:embed="rId4" cstate="email">
+            <a:extLst>
+              <a:ext uri="{28A0092B-C50C-407E-A947-70E740481C1C}">
+                <a14:useLocalDpi xmlns:a14="http://schemas.microsoft.com/office/drawing/2010/main" val="0"/>
+              </a:ext>
+            </a:extLst>
+          </a:blip>
+          <a:stretch>
+            <a:fillRect/>
+          </a:stretch>
+        </p:blipFill>
+        <p:spPr>
+          <a:xfrm>
+            <a:off x="511373" y="11219187"/>
+            <a:ext cx="553998" cy="553998"/>
+          </a:xfrm>
+          <a:prstGeom prst="rect">
+            <a:avLst/>
+          </a:prstGeom>
+          <a:effectLst>
+            <a:outerShdw blurRad="50800" dist="50800" dir="5400000" algn="ctr" rotWithShape="0">
+              <a:schemeClr val="accent2">
+                <a:lumMod val="20000"/>
+                <a:lumOff val="80000"/>
+              </a:schemeClr>
+            </a:outerShdw>
+          </a:effectLst>
+        </p:spPr>
+      </p:pic>
+      <p:grpSp>
+        <p:nvGrpSpPr>
+          <p:cNvPr id="47" name="Ομάδα 46">
+            <a:extLst>
+              <a:ext uri="{FF2B5EF4-FFF2-40B4-BE49-F238E27FC236}">
+                <a16:creationId xmlns:a16="http://schemas.microsoft.com/office/drawing/2014/main" id="{B9F56173-36E2-4617-AE06-7534AB7FA834}"/>
+              </a:ext>
+            </a:extLst>
+          </p:cNvPr>
+          <p:cNvGrpSpPr/>
+          <p:nvPr/>
+        </p:nvGrpSpPr>
+        <p:grpSpPr>
+          <a:xfrm>
+            <a:off x="501847" y="995323"/>
+            <a:ext cx="653535" cy="661591"/>
+            <a:chOff x="411836" y="379320"/>
+            <a:chExt cx="638461" cy="646331"/>
+          </a:xfrm>
+        </p:grpSpPr>
+        <p:pic>
+          <p:nvPicPr>
+            <p:cNvPr id="48" name="Εικόνα 47">
+              <a:extLst>
+                <a:ext uri="{FF2B5EF4-FFF2-40B4-BE49-F238E27FC236}">
+                  <a16:creationId xmlns:a16="http://schemas.microsoft.com/office/drawing/2014/main" id="{EBABDBEB-1FE3-4970-B229-7664D0576FA4}"/>
+                </a:ext>
+              </a:extLst>
+            </p:cNvPr>
+            <p:cNvPicPr>
+              <a:picLocks noChangeAspect="1"/>
+            </p:cNvPicPr>
+            <p:nvPr/>
+          </p:nvPicPr>
+          <p:blipFill>
+            <a:blip r:embed="rId5" cstate="email">
+              <a:extLst>
+                <a:ext uri="{28A0092B-C50C-407E-A947-70E740481C1C}">
+                  <a14:useLocalDpi xmlns:a14="http://schemas.microsoft.com/office/drawing/2010/main" val="0"/>
+                </a:ext>
+              </a:extLst>
+            </a:blip>
+            <a:stretch>
+              <a:fillRect/>
+            </a:stretch>
+          </p:blipFill>
+          <p:spPr>
+            <a:xfrm>
+              <a:off x="411836" y="387190"/>
+              <a:ext cx="638461" cy="638461"/>
+            </a:xfrm>
+            <a:prstGeom prst="rect">
+              <a:avLst/>
+            </a:prstGeom>
+          </p:spPr>
+        </p:pic>
+        <p:sp>
+          <p:nvSpPr>
+            <p:cNvPr id="50" name="TextBox 49">
+              <a:extLst>
+                <a:ext uri="{FF2B5EF4-FFF2-40B4-BE49-F238E27FC236}">
+                  <a16:creationId xmlns:a16="http://schemas.microsoft.com/office/drawing/2014/main" id="{DA91A5EE-FEEE-4530-BD2D-28DDE256175A}"/>
+                </a:ext>
+              </a:extLst>
+            </p:cNvPr>
+            <p:cNvSpPr txBox="1"/>
+            <p:nvPr/>
+          </p:nvSpPr>
+          <p:spPr>
+            <a:xfrm>
+              <a:off x="537172" y="379320"/>
+              <a:ext cx="387787" cy="646331"/>
+            </a:xfrm>
+            <a:prstGeom prst="rect">
+              <a:avLst/>
+            </a:prstGeom>
+            <a:noFill/>
+          </p:spPr>
+          <p:txBody>
+            <a:bodyPr wrap="square" rtlCol="0">
+              <a:spAutoFit/>
+            </a:bodyPr>
+            <a:lstStyle/>
+            <a:p>
+              <a:pPr marL="0" marR="0" lvl="0" indent="0" algn="l" defTabSz="1828434" rtl="0" eaLnBrk="1" fontAlgn="auto" latinLnBrk="0" hangingPunct="1">
+                <a:lnSpc>
+                  <a:spcPct val="100000"/>
+                </a:lnSpc>
+                <a:spcBef>
+                  <a:spcPts val="0"/>
+                </a:spcBef>
+                <a:spcAft>
+                  <a:spcPts val="0"/>
+                </a:spcAft>
+                <a:buClrTx/>
+                <a:buSzTx/>
+                <a:buFontTx/>
+                <a:buNone/>
+                <a:tabLst/>
+                <a:defRPr/>
+              </a:pPr>
+              <a:r>
+                <a:rPr kumimoji="0" lang="el-GR" sz="3600" b="0" i="0" u="none" strike="noStrike" kern="1200" cap="none" spc="0" normalizeH="0" baseline="0" noProof="0" dirty="0">
+                  <a:ln>
+                    <a:noFill/>
+                  </a:ln>
+                  <a:solidFill>
+                    <a:srgbClr val="737572"/>
+                  </a:solidFill>
+                  <a:effectLst/>
+                  <a:uLnTx/>
+                  <a:uFillTx/>
+                  <a:latin typeface="Calibri" panose="020F0502020204030204"/>
+                  <a:ea typeface="+mn-ea"/>
+                  <a:cs typeface="+mn-cs"/>
+                </a:rPr>
+                <a:t>2</a:t>
+              </a:r>
+            </a:p>
+          </p:txBody>
+        </p:sp>
+      </p:grpSp>
+      <p:pic>
+        <p:nvPicPr>
+          <p:cNvPr id="19" name="Εικόνα 18">
+            <a:extLst>
+              <a:ext uri="{FF2B5EF4-FFF2-40B4-BE49-F238E27FC236}">
+                <a16:creationId xmlns:a16="http://schemas.microsoft.com/office/drawing/2014/main" id="{7E1E71D9-14B2-4C83-8D34-E73D379774BF}"/>
+              </a:ext>
+            </a:extLst>
+          </p:cNvPr>
+          <p:cNvPicPr>
+            <a:picLocks noChangeAspect="1"/>
+          </p:cNvPicPr>
+          <p:nvPr/>
+        </p:nvPicPr>
+        <p:blipFill>
+          <a:blip r:embed="rId6" cstate="email">
+            <a:extLst>
+              <a:ext uri="{28A0092B-C50C-407E-A947-70E740481C1C}">
+                <a14:useLocalDpi xmlns:a14="http://schemas.microsoft.com/office/drawing/2010/main" val="0"/>
+              </a:ext>
+            </a:extLst>
+          </a:blip>
+          <a:stretch>
+            <a:fillRect/>
+          </a:stretch>
+        </p:blipFill>
+        <p:spPr>
+          <a:xfrm>
+            <a:off x="11923324" y="12486359"/>
+            <a:ext cx="653569" cy="653569"/>
+          </a:xfrm>
+          <a:prstGeom prst="rect">
+            <a:avLst/>
+          </a:prstGeom>
+        </p:spPr>
+      </p:pic>
+      <p:sp>
+        <p:nvSpPr>
+          <p:cNvPr id="20" name="TextBox 19">
+            <a:extLst>
+              <a:ext uri="{FF2B5EF4-FFF2-40B4-BE49-F238E27FC236}">
+                <a16:creationId xmlns:a16="http://schemas.microsoft.com/office/drawing/2014/main" id="{F1287074-EAD9-4C31-A378-2A15588923B0}"/>
+              </a:ext>
+            </a:extLst>
+          </p:cNvPr>
+          <p:cNvSpPr txBox="1"/>
+          <p:nvPr/>
+        </p:nvSpPr>
+        <p:spPr>
+          <a:xfrm>
+            <a:off x="11923323" y="12549027"/>
+            <a:ext cx="653569" cy="523220"/>
+          </a:xfrm>
+          <a:prstGeom prst="rect">
+            <a:avLst/>
+          </a:prstGeom>
+          <a:noFill/>
+        </p:spPr>
+        <p:txBody>
+          <a:bodyPr wrap="square" rtlCol="0">
+            <a:spAutoFit/>
+          </a:bodyPr>
+          <a:lstStyle/>
+          <a:p>
+            <a:pPr marL="0" marR="0" lvl="0" indent="0" algn="ctr" defTabSz="1828434" rtl="0" eaLnBrk="1" fontAlgn="auto" latinLnBrk="0" hangingPunct="1">
+              <a:lnSpc>
+                <a:spcPct val="100000"/>
+              </a:lnSpc>
+              <a:spcBef>
+                <a:spcPts val="0"/>
+              </a:spcBef>
+              <a:spcAft>
+                <a:spcPts val="0"/>
+              </a:spcAft>
+              <a:buClrTx/>
+              <a:buSzTx/>
+              <a:buFontTx/>
+              <a:buNone/>
+              <a:tabLst/>
+              <a:defRPr/>
+            </a:pPr>
+            <a:r>
+              <a:rPr kumimoji="0" lang="en-US" sz="2800" b="0" i="0" u="none" strike="noStrike" kern="1200" cap="none" spc="0" normalizeH="0" baseline="0" noProof="0" dirty="0">
+                <a:ln>
+                  <a:noFill/>
+                </a:ln>
+                <a:solidFill>
+                  <a:srgbClr val="737572"/>
+                </a:solidFill>
+                <a:effectLst/>
+                <a:uLnTx/>
+                <a:uFillTx/>
+                <a:latin typeface="Calibri" panose="020F0502020204030204"/>
+                <a:ea typeface="+mn-ea"/>
+                <a:cs typeface="+mn-cs"/>
+              </a:rPr>
+              <a:t>13</a:t>
+            </a:r>
+            <a:endParaRPr kumimoji="0" lang="el-GR" sz="2800" b="0" i="0" u="none" strike="noStrike" kern="1200" cap="none" spc="0" normalizeH="0" baseline="0" noProof="0" dirty="0">
+              <a:ln>
+                <a:noFill/>
+              </a:ln>
+              <a:solidFill>
+                <a:srgbClr val="737572"/>
+              </a:solidFill>
+              <a:effectLst/>
+              <a:uLnTx/>
+              <a:uFillTx/>
+              <a:latin typeface="Calibri" panose="020F0502020204030204"/>
+              <a:ea typeface="+mn-ea"/>
+              <a:cs typeface="+mn-cs"/>
+            </a:endParaRPr>
+          </a:p>
+        </p:txBody>
+      </p:sp>
+      <p:pic>
+        <p:nvPicPr>
+          <p:cNvPr id="3" name="Εικόνα 2">
+            <a:extLst>
+              <a:ext uri="{FF2B5EF4-FFF2-40B4-BE49-F238E27FC236}">
+                <a16:creationId xmlns:a16="http://schemas.microsoft.com/office/drawing/2014/main" id="{AF8B9066-C4B8-49A3-A044-88DFC88D3293}"/>
+              </a:ext>
+            </a:extLst>
+          </p:cNvPr>
+          <p:cNvPicPr>
+            <a:picLocks noChangeAspect="1"/>
+          </p:cNvPicPr>
+          <p:nvPr/>
+        </p:nvPicPr>
+        <p:blipFill>
+          <a:blip r:embed="rId7" cstate="email">
+            <a:extLst>
+              <a:ext uri="{28A0092B-C50C-407E-A947-70E740481C1C}">
+                <a14:useLocalDpi xmlns:a14="http://schemas.microsoft.com/office/drawing/2010/main" val="0"/>
+              </a:ext>
+            </a:extLst>
+          </a:blip>
+          <a:stretch>
+            <a:fillRect/>
+          </a:stretch>
+        </p:blipFill>
+        <p:spPr>
+          <a:xfrm>
+            <a:off x="2091966" y="5449401"/>
+            <a:ext cx="3973717" cy="3973717"/>
+          </a:xfrm>
+          <a:prstGeom prst="rect">
+            <a:avLst/>
+          </a:prstGeom>
+        </p:spPr>
+      </p:pic>
+      <p:sp>
+        <p:nvSpPr>
+          <p:cNvPr id="21" name="TextBox 20">
+            <a:extLst>
+              <a:ext uri="{FF2B5EF4-FFF2-40B4-BE49-F238E27FC236}">
+                <a16:creationId xmlns:a16="http://schemas.microsoft.com/office/drawing/2014/main" id="{863DE23E-3CF4-4C0E-95DD-730226F119E4}"/>
+              </a:ext>
+            </a:extLst>
+          </p:cNvPr>
+          <p:cNvSpPr txBox="1"/>
+          <p:nvPr/>
+        </p:nvSpPr>
+        <p:spPr>
+          <a:xfrm>
+            <a:off x="2091966" y="3815485"/>
+            <a:ext cx="4269352" cy="646331"/>
+          </a:xfrm>
+          <a:prstGeom prst="rect">
+            <a:avLst/>
+          </a:prstGeom>
+          <a:noFill/>
+        </p:spPr>
+        <p:txBody>
+          <a:bodyPr wrap="square" rtlCol="0">
+            <a:spAutoFit/>
+          </a:bodyPr>
+          <a:lstStyle/>
+          <a:p>
+            <a:pPr marL="571500" marR="0" lvl="0" indent="-571500" algn="l" defTabSz="1828434" rtl="0" eaLnBrk="1" fontAlgn="auto" latinLnBrk="0" hangingPunct="1">
+              <a:lnSpc>
+                <a:spcPct val="100000"/>
+              </a:lnSpc>
+              <a:spcBef>
+                <a:spcPts val="0"/>
+              </a:spcBef>
+              <a:spcAft>
+                <a:spcPts val="0"/>
+              </a:spcAft>
+              <a:buClrTx/>
+              <a:buSzTx/>
+              <a:buFontTx/>
+              <a:buBlip>
+                <a:blip r:embed="rId8"/>
+              </a:buBlip>
+              <a:tabLst/>
+              <a:defRPr/>
+            </a:pPr>
+            <a:r>
+              <a:rPr lang="el-GR" dirty="0">
+                <a:solidFill>
+                  <a:srgbClr val="445469"/>
+                </a:solidFill>
+                <a:latin typeface="Montserrat Bold"/>
+              </a:rPr>
+              <a:t>Καλώδια </a:t>
+            </a:r>
+            <a:r>
+              <a:rPr lang="en-US" dirty="0">
+                <a:solidFill>
+                  <a:srgbClr val="445469"/>
+                </a:solidFill>
+                <a:latin typeface="Montserrat Bold"/>
+              </a:rPr>
+              <a:t>Jumper</a:t>
+            </a:r>
+            <a:endParaRPr kumimoji="0" lang="el-GR" sz="3600" b="0" i="0" u="none" strike="noStrike" kern="1200" cap="none" spc="0" normalizeH="0" baseline="0" noProof="0" dirty="0">
+              <a:ln>
+                <a:noFill/>
+              </a:ln>
+              <a:solidFill>
+                <a:srgbClr val="445469"/>
+              </a:solidFill>
+              <a:effectLst/>
+              <a:uLnTx/>
+              <a:uFillTx/>
+              <a:latin typeface="Montserrat Bold"/>
+              <a:ea typeface="+mn-ea"/>
+              <a:cs typeface="+mn-cs"/>
+            </a:endParaRPr>
+          </a:p>
+        </p:txBody>
+      </p:sp>
+      <p:pic>
+        <p:nvPicPr>
+          <p:cNvPr id="7" name="Εικόνα 6">
+            <a:extLst>
+              <a:ext uri="{FF2B5EF4-FFF2-40B4-BE49-F238E27FC236}">
+                <a16:creationId xmlns:a16="http://schemas.microsoft.com/office/drawing/2014/main" id="{563244FA-58EA-4363-B5EF-121893D3D61C}"/>
+              </a:ext>
+            </a:extLst>
+          </p:cNvPr>
+          <p:cNvPicPr>
+            <a:picLocks noChangeAspect="1"/>
+          </p:cNvPicPr>
+          <p:nvPr/>
+        </p:nvPicPr>
+        <p:blipFill>
+          <a:blip r:embed="rId9">
+            <a:extLst>
+              <a:ext uri="{28A0092B-C50C-407E-A947-70E740481C1C}">
+                <a14:useLocalDpi xmlns:a14="http://schemas.microsoft.com/office/drawing/2010/main" val="0"/>
+              </a:ext>
+            </a:extLst>
+          </a:blip>
+          <a:stretch>
+            <a:fillRect/>
+          </a:stretch>
+        </p:blipFill>
+        <p:spPr>
+          <a:xfrm>
+            <a:off x="9576522" y="4993689"/>
+            <a:ext cx="4814575" cy="4814575"/>
+          </a:xfrm>
+          <a:prstGeom prst="rect">
+            <a:avLst/>
+          </a:prstGeom>
+        </p:spPr>
+      </p:pic>
+      <p:sp>
+        <p:nvSpPr>
+          <p:cNvPr id="22" name="TextBox 21">
+            <a:extLst>
+              <a:ext uri="{FF2B5EF4-FFF2-40B4-BE49-F238E27FC236}">
+                <a16:creationId xmlns:a16="http://schemas.microsoft.com/office/drawing/2014/main" id="{F9130A2F-0C58-43E8-913C-970A0ECF4D4A}"/>
+              </a:ext>
+            </a:extLst>
+          </p:cNvPr>
+          <p:cNvSpPr txBox="1"/>
+          <p:nvPr/>
+        </p:nvSpPr>
+        <p:spPr>
+          <a:xfrm>
+            <a:off x="17108761" y="3815485"/>
+            <a:ext cx="5294898" cy="646331"/>
+          </a:xfrm>
+          <a:prstGeom prst="rect">
+            <a:avLst/>
+          </a:prstGeom>
+          <a:noFill/>
+        </p:spPr>
+        <p:txBody>
+          <a:bodyPr wrap="square" rtlCol="0">
+            <a:spAutoFit/>
+          </a:bodyPr>
+          <a:lstStyle/>
+          <a:p>
+            <a:pPr marL="571500" marR="0" lvl="0" indent="-571500" algn="l" defTabSz="1828434" rtl="0" eaLnBrk="1" fontAlgn="auto" latinLnBrk="0" hangingPunct="1">
+              <a:lnSpc>
+                <a:spcPct val="100000"/>
+              </a:lnSpc>
+              <a:spcBef>
+                <a:spcPts val="0"/>
+              </a:spcBef>
+              <a:spcAft>
+                <a:spcPts val="0"/>
+              </a:spcAft>
+              <a:buClrTx/>
+              <a:buSzTx/>
+              <a:buFontTx/>
+              <a:buBlip>
+                <a:blip r:embed="rId8"/>
+              </a:buBlip>
+              <a:tabLst/>
+              <a:defRPr/>
+            </a:pPr>
+            <a:r>
+              <a:rPr kumimoji="0" lang="el-GR" sz="3600" b="0" i="0" u="none" strike="noStrike" kern="1200" cap="none" spc="0" normalizeH="0" baseline="0" noProof="0" dirty="0" err="1">
+                <a:ln>
+                  <a:noFill/>
+                </a:ln>
+                <a:solidFill>
+                  <a:srgbClr val="445469"/>
+                </a:solidFill>
+                <a:effectLst/>
+                <a:uLnTx/>
+                <a:uFillTx/>
+                <a:latin typeface="Montserrat Bold"/>
+                <a:ea typeface="+mn-ea"/>
+                <a:cs typeface="+mn-cs"/>
+              </a:rPr>
+              <a:t>Καλ</a:t>
+            </a:r>
+            <a:r>
+              <a:rPr lang="el-GR" dirty="0" err="1">
+                <a:solidFill>
+                  <a:srgbClr val="445469"/>
+                </a:solidFill>
+                <a:latin typeface="Montserrat Bold"/>
+              </a:rPr>
+              <a:t>ώδια</a:t>
+            </a:r>
+            <a:r>
+              <a:rPr lang="el-GR" dirty="0">
+                <a:solidFill>
+                  <a:srgbClr val="445469"/>
+                </a:solidFill>
+                <a:latin typeface="Montserrat Bold"/>
+              </a:rPr>
+              <a:t> Τροφοδοσίας</a:t>
+            </a:r>
+            <a:endParaRPr kumimoji="0" lang="el-GR" sz="3600" b="0" i="0" u="none" strike="noStrike" kern="1200" cap="none" spc="0" normalizeH="0" baseline="0" noProof="0" dirty="0">
+              <a:ln>
+                <a:noFill/>
+              </a:ln>
+              <a:solidFill>
+                <a:srgbClr val="445469"/>
+              </a:solidFill>
+              <a:effectLst/>
+              <a:uLnTx/>
+              <a:uFillTx/>
+              <a:latin typeface="Montserrat Bold"/>
+              <a:ea typeface="+mn-ea"/>
+              <a:cs typeface="+mn-cs"/>
+            </a:endParaRPr>
+          </a:p>
+        </p:txBody>
+      </p:sp>
+      <p:sp>
+        <p:nvSpPr>
+          <p:cNvPr id="31" name="TextBox 30">
+            <a:extLst>
+              <a:ext uri="{FF2B5EF4-FFF2-40B4-BE49-F238E27FC236}">
+                <a16:creationId xmlns:a16="http://schemas.microsoft.com/office/drawing/2014/main" id="{1976BA02-CF7B-4031-9B66-793C2C5A633D}"/>
+              </a:ext>
+            </a:extLst>
+          </p:cNvPr>
+          <p:cNvSpPr txBox="1"/>
+          <p:nvPr/>
+        </p:nvSpPr>
+        <p:spPr>
+          <a:xfrm>
+            <a:off x="9488761" y="3815484"/>
+            <a:ext cx="5294898" cy="646331"/>
+          </a:xfrm>
+          <a:prstGeom prst="rect">
+            <a:avLst/>
+          </a:prstGeom>
+          <a:noFill/>
+        </p:spPr>
+        <p:txBody>
+          <a:bodyPr wrap="square" rtlCol="0">
+            <a:spAutoFit/>
+          </a:bodyPr>
+          <a:lstStyle/>
+          <a:p>
+            <a:pPr marL="571500" marR="0" lvl="0" indent="-571500" algn="l" defTabSz="1828434" rtl="0" eaLnBrk="1" fontAlgn="auto" latinLnBrk="0" hangingPunct="1">
+              <a:lnSpc>
+                <a:spcPct val="100000"/>
+              </a:lnSpc>
+              <a:spcBef>
+                <a:spcPts val="0"/>
+              </a:spcBef>
+              <a:spcAft>
+                <a:spcPts val="0"/>
+              </a:spcAft>
+              <a:buClrTx/>
+              <a:buSzTx/>
+              <a:buFontTx/>
+              <a:buBlip>
+                <a:blip r:embed="rId8"/>
+              </a:buBlip>
+              <a:tabLst/>
+              <a:defRPr/>
+            </a:pPr>
+            <a:r>
+              <a:rPr kumimoji="0" lang="el-GR" sz="3600" b="0" i="0" u="none" strike="noStrike" kern="1200" cap="none" spc="0" normalizeH="0" baseline="0" noProof="0" dirty="0" err="1">
+                <a:ln>
+                  <a:noFill/>
+                </a:ln>
+                <a:solidFill>
+                  <a:srgbClr val="445469"/>
+                </a:solidFill>
+                <a:effectLst/>
+                <a:uLnTx/>
+                <a:uFillTx/>
+                <a:latin typeface="Montserrat Bold"/>
+                <a:ea typeface="+mn-ea"/>
+                <a:cs typeface="+mn-cs"/>
+              </a:rPr>
+              <a:t>Καλ</a:t>
+            </a:r>
+            <a:r>
+              <a:rPr lang="el-GR" dirty="0" err="1">
+                <a:solidFill>
+                  <a:srgbClr val="445469"/>
+                </a:solidFill>
+                <a:latin typeface="Montserrat Bold"/>
+              </a:rPr>
+              <a:t>ώδιο</a:t>
+            </a:r>
+            <a:r>
+              <a:rPr lang="el-GR" dirty="0">
+                <a:solidFill>
+                  <a:srgbClr val="445469"/>
+                </a:solidFill>
+                <a:latin typeface="Montserrat Bold"/>
+              </a:rPr>
+              <a:t> </a:t>
+            </a:r>
+            <a:r>
+              <a:rPr lang="en-US" dirty="0">
+                <a:solidFill>
+                  <a:srgbClr val="445469"/>
+                </a:solidFill>
+                <a:latin typeface="Montserrat Bold"/>
+              </a:rPr>
+              <a:t>RJ45 </a:t>
+            </a:r>
+            <a:r>
+              <a:rPr kumimoji="0" lang="en-US" sz="3600" b="0" i="0" u="none" strike="noStrike" kern="1200" cap="none" spc="0" normalizeH="0" baseline="0" noProof="0" dirty="0">
+                <a:ln>
+                  <a:noFill/>
+                </a:ln>
+                <a:solidFill>
+                  <a:srgbClr val="445469"/>
+                </a:solidFill>
+                <a:effectLst/>
+                <a:uLnTx/>
+                <a:uFillTx/>
+                <a:latin typeface="Montserrat Bold"/>
+                <a:ea typeface="+mn-ea"/>
+                <a:cs typeface="+mn-cs"/>
+              </a:rPr>
+              <a:t>Ethernet</a:t>
+            </a:r>
+            <a:endParaRPr kumimoji="0" lang="el-GR" sz="3600" b="0" i="0" u="none" strike="noStrike" kern="1200" cap="none" spc="0" normalizeH="0" baseline="0" noProof="0" dirty="0">
+              <a:ln>
+                <a:noFill/>
+              </a:ln>
+              <a:solidFill>
+                <a:srgbClr val="445469"/>
+              </a:solidFill>
+              <a:effectLst/>
+              <a:uLnTx/>
+              <a:uFillTx/>
+              <a:latin typeface="Montserrat Bold"/>
+              <a:ea typeface="+mn-ea"/>
+              <a:cs typeface="+mn-cs"/>
+            </a:endParaRPr>
+          </a:p>
+        </p:txBody>
+      </p:sp>
+      <p:pic>
+        <p:nvPicPr>
+          <p:cNvPr id="34" name="Εικόνα 33">
+            <a:extLst>
+              <a:ext uri="{FF2B5EF4-FFF2-40B4-BE49-F238E27FC236}">
+                <a16:creationId xmlns:a16="http://schemas.microsoft.com/office/drawing/2014/main" id="{15DDA1AC-60A0-4AC4-9906-32FD40321970}"/>
+              </a:ext>
+            </a:extLst>
+          </p:cNvPr>
+          <p:cNvPicPr>
+            <a:picLocks noChangeAspect="1"/>
+          </p:cNvPicPr>
+          <p:nvPr/>
+        </p:nvPicPr>
+        <p:blipFill>
+          <a:blip r:embed="rId10" cstate="email">
+            <a:extLst>
+              <a:ext uri="{28A0092B-C50C-407E-A947-70E740481C1C}">
+                <a14:useLocalDpi xmlns:a14="http://schemas.microsoft.com/office/drawing/2010/main" val="0"/>
+              </a:ext>
+            </a:extLst>
+          </a:blip>
+          <a:stretch>
+            <a:fillRect/>
+          </a:stretch>
+        </p:blipFill>
+        <p:spPr>
+          <a:xfrm>
+            <a:off x="17357055" y="4993689"/>
+            <a:ext cx="4798308" cy="4814575"/>
+          </a:xfrm>
+          <a:prstGeom prst="rect">
+            <a:avLst/>
+          </a:prstGeom>
+        </p:spPr>
+      </p:pic>
+    </p:spTree>
+    <p:extLst>
+      <p:ext uri="{BB962C8B-B14F-4D97-AF65-F5344CB8AC3E}">
+        <p14:creationId xmlns:p14="http://schemas.microsoft.com/office/powerpoint/2010/main" val="4085465149"/>
+      </p:ext>
+    </p:extLst>
+  </p:cSld>
+  <p:clrMapOvr>
+    <a:masterClrMapping/>
+  </p:clrMapOvr>
+  <p:transition spd="slow">
+    <p:push dir="u"/>
+  </p:transition>
+  <p:timing>
+    <p:tnLst>
+      <p:par>
+        <p:cTn id="1" dur="indefinite" restart="never" nodeType="tmRoot">
+          <p:childTnLst>
+            <p:seq concurrent="1" nextAc="seek">
+              <p:cTn id="2" dur="indefinite" nodeType="mainSeq">
+                <p:childTnLst>
+                  <p:par>
+                    <p:cTn id="3" fill="hold">
+                      <p:stCondLst>
+                        <p:cond delay="indefinite"/>
+                      </p:stCondLst>
+                      <p:childTnLst>
+                        <p:par>
+                          <p:cTn id="4" fill="hold">
+                            <p:stCondLst>
+                              <p:cond delay="0"/>
+                            </p:stCondLst>
+                            <p:childTnLst>
+                              <p:par>
+                                <p:cTn id="5" presetID="10" presetClass="entr" presetSubtype="0" fill="hold" grpId="0" nodeType="clickEffect">
+                                  <p:stCondLst>
+                                    <p:cond delay="0"/>
+                                  </p:stCondLst>
+                                  <p:childTnLst>
+                                    <p:set>
+                                      <p:cBhvr>
+                                        <p:cTn id="6" dur="1" fill="hold">
+                                          <p:stCondLst>
+                                            <p:cond delay="0"/>
+                                          </p:stCondLst>
+                                        </p:cTn>
+                                        <p:tgtEl>
+                                          <p:spTgt spid="21"/>
+                                        </p:tgtEl>
+                                        <p:attrNameLst>
+                                          <p:attrName>style.visibility</p:attrName>
+                                        </p:attrNameLst>
+                                      </p:cBhvr>
+                                      <p:to>
+                                        <p:strVal val="visible"/>
+                                      </p:to>
+                                    </p:set>
+                                    <p:animEffect transition="in" filter="fade">
+                                      <p:cBhvr>
+                                        <p:cTn id="7" dur="500"/>
+                                        <p:tgtEl>
+                                          <p:spTgt spid="21"/>
+                                        </p:tgtEl>
+                                      </p:cBhvr>
+                                    </p:animEffect>
+                                  </p:childTnLst>
+                                </p:cTn>
+                              </p:par>
+                              <p:par>
+                                <p:cTn id="8" presetID="10" presetClass="entr" presetSubtype="0" fill="hold" nodeType="withEffect">
+                                  <p:stCondLst>
+                                    <p:cond delay="0"/>
+                                  </p:stCondLst>
+                                  <p:childTnLst>
+                                    <p:set>
+                                      <p:cBhvr>
+                                        <p:cTn id="9" dur="1" fill="hold">
+                                          <p:stCondLst>
+                                            <p:cond delay="0"/>
+                                          </p:stCondLst>
+                                        </p:cTn>
+                                        <p:tgtEl>
+                                          <p:spTgt spid="3"/>
+                                        </p:tgtEl>
+                                        <p:attrNameLst>
+                                          <p:attrName>style.visibility</p:attrName>
+                                        </p:attrNameLst>
+                                      </p:cBhvr>
+                                      <p:to>
+                                        <p:strVal val="visible"/>
+                                      </p:to>
+                                    </p:set>
+                                    <p:animEffect transition="in" filter="fade">
+                                      <p:cBhvr>
+                                        <p:cTn id="10" dur="500"/>
+                                        <p:tgtEl>
+                                          <p:spTgt spid="3"/>
+                                        </p:tgtEl>
+                                      </p:cBhvr>
+                                    </p:animEffect>
+                                  </p:childTnLst>
+                                </p:cTn>
+                              </p:par>
+                            </p:childTnLst>
+                          </p:cTn>
+                        </p:par>
+                      </p:childTnLst>
+                    </p:cTn>
+                  </p:par>
+                  <p:par>
+                    <p:cTn id="11" fill="hold">
+                      <p:stCondLst>
+                        <p:cond delay="indefinite"/>
+                      </p:stCondLst>
+                      <p:childTnLst>
+                        <p:par>
+                          <p:cTn id="12" fill="hold">
+                            <p:stCondLst>
+                              <p:cond delay="0"/>
+                            </p:stCondLst>
+                            <p:childTnLst>
+                              <p:par>
+                                <p:cTn id="13" presetID="10" presetClass="entr" presetSubtype="0" fill="hold" nodeType="clickEffect">
+                                  <p:stCondLst>
+                                    <p:cond delay="0"/>
+                                  </p:stCondLst>
+                                  <p:childTnLst>
+                                    <p:set>
+                                      <p:cBhvr>
+                                        <p:cTn id="14" dur="1" fill="hold">
+                                          <p:stCondLst>
+                                            <p:cond delay="0"/>
+                                          </p:stCondLst>
+                                        </p:cTn>
+                                        <p:tgtEl>
+                                          <p:spTgt spid="7"/>
+                                        </p:tgtEl>
+                                        <p:attrNameLst>
+                                          <p:attrName>style.visibility</p:attrName>
+                                        </p:attrNameLst>
+                                      </p:cBhvr>
+                                      <p:to>
+                                        <p:strVal val="visible"/>
+                                      </p:to>
+                                    </p:set>
+                                    <p:animEffect transition="in" filter="fade">
+                                      <p:cBhvr>
+                                        <p:cTn id="15" dur="500"/>
+                                        <p:tgtEl>
+                                          <p:spTgt spid="7"/>
+                                        </p:tgtEl>
+                                      </p:cBhvr>
+                                    </p:animEffect>
+                                  </p:childTnLst>
+                                </p:cTn>
+                              </p:par>
+                              <p:par>
+                                <p:cTn id="16" presetID="10" presetClass="entr" presetSubtype="0" fill="hold" grpId="0" nodeType="withEffect">
+                                  <p:stCondLst>
+                                    <p:cond delay="0"/>
+                                  </p:stCondLst>
+                                  <p:childTnLst>
+                                    <p:set>
+                                      <p:cBhvr>
+                                        <p:cTn id="17" dur="1" fill="hold">
+                                          <p:stCondLst>
+                                            <p:cond delay="0"/>
+                                          </p:stCondLst>
+                                        </p:cTn>
+                                        <p:tgtEl>
+                                          <p:spTgt spid="31"/>
+                                        </p:tgtEl>
+                                        <p:attrNameLst>
+                                          <p:attrName>style.visibility</p:attrName>
+                                        </p:attrNameLst>
+                                      </p:cBhvr>
+                                      <p:to>
+                                        <p:strVal val="visible"/>
+                                      </p:to>
+                                    </p:set>
+                                    <p:animEffect transition="in" filter="fade">
+                                      <p:cBhvr>
+                                        <p:cTn id="18" dur="500"/>
+                                        <p:tgtEl>
+                                          <p:spTgt spid="31"/>
+                                        </p:tgtEl>
+                                      </p:cBhvr>
+                                    </p:animEffect>
+                                  </p:childTnLst>
+                                </p:cTn>
+                              </p:par>
+                            </p:childTnLst>
+                          </p:cTn>
+                        </p:par>
+                      </p:childTnLst>
+                    </p:cTn>
+                  </p:par>
+                  <p:par>
+                    <p:cTn id="19" fill="hold">
+                      <p:stCondLst>
+                        <p:cond delay="indefinite"/>
+                      </p:stCondLst>
+                      <p:childTnLst>
+                        <p:par>
+                          <p:cTn id="20" fill="hold">
+                            <p:stCondLst>
+                              <p:cond delay="0"/>
+                            </p:stCondLst>
+                            <p:childTnLst>
+                              <p:par>
+                                <p:cTn id="21" presetID="10" presetClass="entr" presetSubtype="0" fill="hold" nodeType="clickEffect">
+                                  <p:stCondLst>
+                                    <p:cond delay="0"/>
+                                  </p:stCondLst>
+                                  <p:childTnLst>
+                                    <p:set>
+                                      <p:cBhvr>
+                                        <p:cTn id="22" dur="1" fill="hold">
+                                          <p:stCondLst>
+                                            <p:cond delay="0"/>
+                                          </p:stCondLst>
+                                        </p:cTn>
+                                        <p:tgtEl>
+                                          <p:spTgt spid="34"/>
+                                        </p:tgtEl>
+                                        <p:attrNameLst>
+                                          <p:attrName>style.visibility</p:attrName>
+                                        </p:attrNameLst>
+                                      </p:cBhvr>
+                                      <p:to>
+                                        <p:strVal val="visible"/>
+                                      </p:to>
+                                    </p:set>
+                                    <p:animEffect transition="in" filter="fade">
+                                      <p:cBhvr>
+                                        <p:cTn id="23" dur="500"/>
+                                        <p:tgtEl>
+                                          <p:spTgt spid="34"/>
+                                        </p:tgtEl>
+                                      </p:cBhvr>
+                                    </p:animEffect>
+                                  </p:childTnLst>
+                                </p:cTn>
+                              </p:par>
+                              <p:par>
+                                <p:cTn id="24" presetID="10" presetClass="entr" presetSubtype="0" fill="hold" grpId="0" nodeType="withEffect">
+                                  <p:stCondLst>
+                                    <p:cond delay="0"/>
+                                  </p:stCondLst>
+                                  <p:childTnLst>
+                                    <p:set>
+                                      <p:cBhvr>
+                                        <p:cTn id="25" dur="1" fill="hold">
+                                          <p:stCondLst>
+                                            <p:cond delay="0"/>
+                                          </p:stCondLst>
+                                        </p:cTn>
+                                        <p:tgtEl>
+                                          <p:spTgt spid="22"/>
+                                        </p:tgtEl>
+                                        <p:attrNameLst>
+                                          <p:attrName>style.visibility</p:attrName>
+                                        </p:attrNameLst>
+                                      </p:cBhvr>
+                                      <p:to>
+                                        <p:strVal val="visible"/>
+                                      </p:to>
+                                    </p:set>
+                                    <p:animEffect transition="in" filter="fade">
+                                      <p:cBhvr>
+                                        <p:cTn id="26" dur="500"/>
+                                        <p:tgtEl>
+                                          <p:spTgt spid="22"/>
+                                        </p:tgtEl>
+                                      </p:cBhvr>
+                                    </p:animEffect>
+                                  </p:childTnLst>
+                                </p:cTn>
+                              </p:par>
+                            </p:childTnLst>
+                          </p:cTn>
+                        </p:par>
+                      </p:childTnLst>
+                    </p:cTn>
+                  </p:par>
+                </p:childTnLst>
+              </p:cTn>
+              <p:prevCondLst>
+                <p:cond evt="onPrev" delay="0">
+                  <p:tgtEl>
+                    <p:sldTgt/>
+                  </p:tgtEl>
+                </p:cond>
+              </p:prevCondLst>
+              <p:nextCondLst>
+                <p:cond evt="onNext" delay="0">
+                  <p:tgtEl>
+                    <p:sldTgt/>
+                  </p:tgtEl>
+                </p:cond>
+              </p:nextCondLst>
+            </p:seq>
+          </p:childTnLst>
+        </p:cTn>
+      </p:par>
+    </p:tnLst>
+    <p:bldLst>
+      <p:bldP spid="21" grpId="0"/>
+      <p:bldP spid="22" grpId="0"/>
+      <p:bldP spid="31" grpId="0"/>
+    </p:bldLst>
+  </p:timing>
 </p:sld>
 </file>
 
@@ -15061,13 +18041,13 @@
   <p:clrMapOvr>
     <a:masterClrMapping/>
   </p:clrMapOvr>
-  <mc:AlternateContent xmlns:mc="http://schemas.openxmlformats.org/markup-compatibility/2006">
-    <mc:Choice xmlns:p159="http://schemas.microsoft.com/office/powerpoint/2015/09/main" Requires="p159">
+  <mc:AlternateContent xmlns:mc="http://schemas.openxmlformats.org/markup-compatibility/2006" xmlns:p159="http://schemas.microsoft.com/office/powerpoint/2015/09/main">
+    <mc:Choice Requires="p159">
       <p:transition xmlns:p14="http://schemas.microsoft.com/office/powerpoint/2010/main" spd="slow" p14:dur="1250">
         <p159:morph option="byObject"/>
       </p:transition>
     </mc:Choice>
-    <mc:Fallback>
+    <mc:Fallback xmlns="">
       <p:transition spd="slow">
         <p:fade/>
       </p:transition>

</xml_diff>